<commit_message>
Updated to reflect current dataflow
</commit_message>
<xml_diff>
--- a/dataflow-analysis.pptx
+++ b/dataflow-analysis.pptx
@@ -1,114 +1,19 @@
 
 <file path=ppt/presentation.xml><?xml version="1.0" encoding="utf-8"?>
-<p:presentation xmlns:a="http://schemas.openxmlformats.org/drawingml/2006/main" xmlns:r="http://schemas.openxmlformats.org/officeDocument/2006/relationships" xmlns:p="http://schemas.openxmlformats.org/presentationml/2006/main">
+<p:presentation xmlns:a="http://schemas.openxmlformats.org/drawingml/2006/main" xmlns:p="http://schemas.openxmlformats.org/presentationml/2006/main" xmlns:r="http://schemas.openxmlformats.org/officeDocument/2006/relationships">
   <p:sldMasterIdLst>
-    <p:sldMasterId id="2147483648" r:id="rId1"/>
+    <p:sldMasterId id="2147483648" r:id="rId2"/>
   </p:sldMasterIdLst>
   <p:sldIdLst>
-    <p:sldId id="256" r:id="rId2"/>
+    <p:sldId id="256" r:id="rId3"/>
   </p:sldIdLst>
-  <p:sldSz cx="9144000" cy="6858000" type="screen4x3"/>
+  <p:sldSz cx="9144000" cy="6858000"/>
   <p:notesSz cx="7772400" cy="10058400"/>
-  <p:defaultTextStyle>
-    <a:defPPr>
-      <a:defRPr lang="en-US"/>
-    </a:defPPr>
-    <a:lvl1pPr marL="0" algn="l" defTabSz="914400" rtl="0" eaLnBrk="1" latinLnBrk="0" hangingPunct="1">
-      <a:defRPr sz="1800" kern="1200">
-        <a:solidFill>
-          <a:schemeClr val="tx1"/>
-        </a:solidFill>
-        <a:latin typeface="+mn-lt"/>
-        <a:ea typeface="+mn-ea"/>
-        <a:cs typeface="+mn-cs"/>
-      </a:defRPr>
-    </a:lvl1pPr>
-    <a:lvl2pPr marL="457200" algn="l" defTabSz="914400" rtl="0" eaLnBrk="1" latinLnBrk="0" hangingPunct="1">
-      <a:defRPr sz="1800" kern="1200">
-        <a:solidFill>
-          <a:schemeClr val="tx1"/>
-        </a:solidFill>
-        <a:latin typeface="+mn-lt"/>
-        <a:ea typeface="+mn-ea"/>
-        <a:cs typeface="+mn-cs"/>
-      </a:defRPr>
-    </a:lvl2pPr>
-    <a:lvl3pPr marL="914400" algn="l" defTabSz="914400" rtl="0" eaLnBrk="1" latinLnBrk="0" hangingPunct="1">
-      <a:defRPr sz="1800" kern="1200">
-        <a:solidFill>
-          <a:schemeClr val="tx1"/>
-        </a:solidFill>
-        <a:latin typeface="+mn-lt"/>
-        <a:ea typeface="+mn-ea"/>
-        <a:cs typeface="+mn-cs"/>
-      </a:defRPr>
-    </a:lvl3pPr>
-    <a:lvl4pPr marL="1371600" algn="l" defTabSz="914400" rtl="0" eaLnBrk="1" latinLnBrk="0" hangingPunct="1">
-      <a:defRPr sz="1800" kern="1200">
-        <a:solidFill>
-          <a:schemeClr val="tx1"/>
-        </a:solidFill>
-        <a:latin typeface="+mn-lt"/>
-        <a:ea typeface="+mn-ea"/>
-        <a:cs typeface="+mn-cs"/>
-      </a:defRPr>
-    </a:lvl4pPr>
-    <a:lvl5pPr marL="1828800" algn="l" defTabSz="914400" rtl="0" eaLnBrk="1" latinLnBrk="0" hangingPunct="1">
-      <a:defRPr sz="1800" kern="1200">
-        <a:solidFill>
-          <a:schemeClr val="tx1"/>
-        </a:solidFill>
-        <a:latin typeface="+mn-lt"/>
-        <a:ea typeface="+mn-ea"/>
-        <a:cs typeface="+mn-cs"/>
-      </a:defRPr>
-    </a:lvl5pPr>
-    <a:lvl6pPr marL="2286000" algn="l" defTabSz="914400" rtl="0" eaLnBrk="1" latinLnBrk="0" hangingPunct="1">
-      <a:defRPr sz="1800" kern="1200">
-        <a:solidFill>
-          <a:schemeClr val="tx1"/>
-        </a:solidFill>
-        <a:latin typeface="+mn-lt"/>
-        <a:ea typeface="+mn-ea"/>
-        <a:cs typeface="+mn-cs"/>
-      </a:defRPr>
-    </a:lvl6pPr>
-    <a:lvl7pPr marL="2743200" algn="l" defTabSz="914400" rtl="0" eaLnBrk="1" latinLnBrk="0" hangingPunct="1">
-      <a:defRPr sz="1800" kern="1200">
-        <a:solidFill>
-          <a:schemeClr val="tx1"/>
-        </a:solidFill>
-        <a:latin typeface="+mn-lt"/>
-        <a:ea typeface="+mn-ea"/>
-        <a:cs typeface="+mn-cs"/>
-      </a:defRPr>
-    </a:lvl7pPr>
-    <a:lvl8pPr marL="3200400" algn="l" defTabSz="914400" rtl="0" eaLnBrk="1" latinLnBrk="0" hangingPunct="1">
-      <a:defRPr sz="1800" kern="1200">
-        <a:solidFill>
-          <a:schemeClr val="tx1"/>
-        </a:solidFill>
-        <a:latin typeface="+mn-lt"/>
-        <a:ea typeface="+mn-ea"/>
-        <a:cs typeface="+mn-cs"/>
-      </a:defRPr>
-    </a:lvl8pPr>
-    <a:lvl9pPr marL="3657600" algn="l" defTabSz="914400" rtl="0" eaLnBrk="1" latinLnBrk="0" hangingPunct="1">
-      <a:defRPr sz="1800" kern="1200">
-        <a:solidFill>
-          <a:schemeClr val="tx1"/>
-        </a:solidFill>
-        <a:latin typeface="+mn-lt"/>
-        <a:ea typeface="+mn-ea"/>
-        <a:cs typeface="+mn-cs"/>
-      </a:defRPr>
-    </a:lvl9pPr>
-  </p:defaultTextStyle>
 </p:presentation>
 </file>
 
 <file path=ppt/slideLayouts/slideLayout1.xml><?xml version="1.0" encoding="utf-8"?>
-<p:sldLayout xmlns:a="http://schemas.openxmlformats.org/drawingml/2006/main" xmlns:r="http://schemas.openxmlformats.org/officeDocument/2006/relationships" xmlns:p="http://schemas.openxmlformats.org/presentationml/2006/main" type="blank" preserve="1">
+<p:sldLayout xmlns:a="http://schemas.openxmlformats.org/drawingml/2006/main" xmlns:p="http://schemas.openxmlformats.org/presentationml/2006/main" xmlns:r="http://schemas.openxmlformats.org/officeDocument/2006/relationships" type="blank" preserve="1">
   <p:cSld name="Blank Slide">
     <p:spTree>
       <p:nvGrpSpPr>
@@ -126,14 +31,11 @@
       </p:grpSpPr>
     </p:spTree>
   </p:cSld>
-  <p:clrMapOvr>
-    <a:masterClrMapping/>
-  </p:clrMapOvr>
 </p:sldLayout>
 </file>
 
 <file path=ppt/slideLayouts/slideLayout10.xml><?xml version="1.0" encoding="utf-8"?>
-<p:sldLayout xmlns:a="http://schemas.openxmlformats.org/drawingml/2006/main" xmlns:r="http://schemas.openxmlformats.org/officeDocument/2006/relationships" xmlns:p="http://schemas.openxmlformats.org/presentationml/2006/main" type="objOverTx" preserve="1">
+<p:sldLayout xmlns:a="http://schemas.openxmlformats.org/drawingml/2006/main" xmlns:p="http://schemas.openxmlformats.org/presentationml/2006/main" xmlns:r="http://schemas.openxmlformats.org/officeDocument/2006/relationships" type="objOverTx" preserve="1">
   <p:cSld name="Title, Content over Content">
     <p:spTree>
       <p:nvGrpSpPr>
@@ -151,7 +53,7 @@
       </p:grpSpPr>
       <p:sp>
         <p:nvSpPr>
-          <p:cNvPr id="23" name="PlaceHolder 1"/>
+          <p:cNvPr id="21" name="PlaceHolder 1"/>
           <p:cNvSpPr>
             <a:spLocks noGrp="1"/>
           </p:cNvSpPr>
@@ -162,15 +64,14 @@
         <p:spPr>
           <a:xfrm>
             <a:off x="457200" y="273600"/>
-            <a:ext cx="8229240" cy="1145160"/>
-          </a:xfrm>
-          <a:prstGeom prst="rect">
-            <a:avLst/>
-          </a:prstGeom>
-        </p:spPr>
-        <p:txBody>
-          <a:bodyPr lIns="0" tIns="0" rIns="0" bIns="0" anchor="ctr"/>
-          <a:lstStyle/>
+            <a:ext cx="8229240" cy="1144800"/>
+          </a:xfrm>
+          <a:prstGeom prst="rect">
+            <a:avLst/>
+          </a:prstGeom>
+        </p:spPr>
+        <p:txBody>
+          <a:bodyPr lIns="0" rIns="0" tIns="0" bIns="0" anchor="ctr"/>
           <a:p>
             <a:pPr algn="ctr"/>
             <a:endParaRPr/>
@@ -179,7 +80,7 @@
       </p:sp>
       <p:sp>
         <p:nvSpPr>
-          <p:cNvPr id="24" name="PlaceHolder 2"/>
+          <p:cNvPr id="22" name="PlaceHolder 2"/>
           <p:cNvSpPr>
             <a:spLocks noGrp="1"/>
           </p:cNvSpPr>
@@ -197,16 +98,15 @@
           </a:prstGeom>
         </p:spPr>
         <p:txBody>
-          <a:bodyPr lIns="0" tIns="0" rIns="0" bIns="0"/>
-          <a:lstStyle/>
-          <a:p>
-            <a:endParaRPr/>
-          </a:p>
-        </p:txBody>
-      </p:sp>
-      <p:sp>
-        <p:nvSpPr>
-          <p:cNvPr id="25" name="PlaceHolder 3"/>
+          <a:bodyPr lIns="0" rIns="0" tIns="0" bIns="0"/>
+          <a:p>
+            <a:endParaRPr/>
+          </a:p>
+        </p:txBody>
+      </p:sp>
+      <p:sp>
+        <p:nvSpPr>
+          <p:cNvPr id="23" name="PlaceHolder 3"/>
           <p:cNvSpPr>
             <a:spLocks noGrp="1"/>
           </p:cNvSpPr>
@@ -224,8 +124,7 @@
           </a:prstGeom>
         </p:spPr>
         <p:txBody>
-          <a:bodyPr lIns="0" tIns="0" rIns="0" bIns="0"/>
-          <a:lstStyle/>
+          <a:bodyPr lIns="0" rIns="0" tIns="0" bIns="0"/>
           <a:p>
             <a:endParaRPr/>
           </a:p>
@@ -233,14 +132,11 @@
       </p:sp>
     </p:spTree>
   </p:cSld>
-  <p:clrMapOvr>
-    <a:masterClrMapping/>
-  </p:clrMapOvr>
 </p:sldLayout>
 </file>
 
 <file path=ppt/slideLayouts/slideLayout11.xml><?xml version="1.0" encoding="utf-8"?>
-<p:sldLayout xmlns:a="http://schemas.openxmlformats.org/drawingml/2006/main" xmlns:r="http://schemas.openxmlformats.org/officeDocument/2006/relationships" xmlns:p="http://schemas.openxmlformats.org/presentationml/2006/main" type="fourObj" preserve="1">
+<p:sldLayout xmlns:a="http://schemas.openxmlformats.org/drawingml/2006/main" xmlns:p="http://schemas.openxmlformats.org/presentationml/2006/main" xmlns:r="http://schemas.openxmlformats.org/officeDocument/2006/relationships" type="fourObj" preserve="1">
   <p:cSld name="Title, 4 Content">
     <p:spTree>
       <p:nvGrpSpPr>
@@ -258,7 +154,7 @@
       </p:grpSpPr>
       <p:sp>
         <p:nvSpPr>
-          <p:cNvPr id="26" name="PlaceHolder 1"/>
+          <p:cNvPr id="24" name="PlaceHolder 1"/>
           <p:cNvSpPr>
             <a:spLocks noGrp="1"/>
           </p:cNvSpPr>
@@ -269,15 +165,14 @@
         <p:spPr>
           <a:xfrm>
             <a:off x="457200" y="273600"/>
-            <a:ext cx="8229240" cy="1145160"/>
-          </a:xfrm>
-          <a:prstGeom prst="rect">
-            <a:avLst/>
-          </a:prstGeom>
-        </p:spPr>
-        <p:txBody>
-          <a:bodyPr lIns="0" tIns="0" rIns="0" bIns="0" anchor="ctr"/>
-          <a:lstStyle/>
+            <a:ext cx="8229240" cy="1144800"/>
+          </a:xfrm>
+          <a:prstGeom prst="rect">
+            <a:avLst/>
+          </a:prstGeom>
+        </p:spPr>
+        <p:txBody>
+          <a:bodyPr lIns="0" rIns="0" tIns="0" bIns="0" anchor="ctr"/>
           <a:p>
             <a:pPr algn="ctr"/>
             <a:endParaRPr/>
@@ -286,7 +181,7 @@
       </p:sp>
       <p:sp>
         <p:nvSpPr>
-          <p:cNvPr id="27" name="PlaceHolder 2"/>
+          <p:cNvPr id="25" name="PlaceHolder 2"/>
           <p:cNvSpPr>
             <a:spLocks noGrp="1"/>
           </p:cNvSpPr>
@@ -304,16 +199,15 @@
           </a:prstGeom>
         </p:spPr>
         <p:txBody>
-          <a:bodyPr lIns="0" tIns="0" rIns="0" bIns="0"/>
-          <a:lstStyle/>
-          <a:p>
-            <a:endParaRPr/>
-          </a:p>
-        </p:txBody>
-      </p:sp>
-      <p:sp>
-        <p:nvSpPr>
-          <p:cNvPr id="28" name="PlaceHolder 3"/>
+          <a:bodyPr lIns="0" rIns="0" tIns="0" bIns="0"/>
+          <a:p>
+            <a:endParaRPr/>
+          </a:p>
+        </p:txBody>
+      </p:sp>
+      <p:sp>
+        <p:nvSpPr>
+          <p:cNvPr id="26" name="PlaceHolder 3"/>
           <p:cNvSpPr>
             <a:spLocks noGrp="1"/>
           </p:cNvSpPr>
@@ -331,16 +225,15 @@
           </a:prstGeom>
         </p:spPr>
         <p:txBody>
-          <a:bodyPr lIns="0" tIns="0" rIns="0" bIns="0"/>
-          <a:lstStyle/>
-          <a:p>
-            <a:endParaRPr/>
-          </a:p>
-        </p:txBody>
-      </p:sp>
-      <p:sp>
-        <p:nvSpPr>
-          <p:cNvPr id="29" name="PlaceHolder 4"/>
+          <a:bodyPr lIns="0" rIns="0" tIns="0" bIns="0"/>
+          <a:p>
+            <a:endParaRPr/>
+          </a:p>
+        </p:txBody>
+      </p:sp>
+      <p:sp>
+        <p:nvSpPr>
+          <p:cNvPr id="27" name="PlaceHolder 4"/>
           <p:cNvSpPr>
             <a:spLocks noGrp="1"/>
           </p:cNvSpPr>
@@ -358,16 +251,15 @@
           </a:prstGeom>
         </p:spPr>
         <p:txBody>
-          <a:bodyPr lIns="0" tIns="0" rIns="0" bIns="0"/>
-          <a:lstStyle/>
-          <a:p>
-            <a:endParaRPr/>
-          </a:p>
-        </p:txBody>
-      </p:sp>
-      <p:sp>
-        <p:nvSpPr>
-          <p:cNvPr id="30" name="PlaceHolder 5"/>
+          <a:bodyPr lIns="0" rIns="0" tIns="0" bIns="0"/>
+          <a:p>
+            <a:endParaRPr/>
+          </a:p>
+        </p:txBody>
+      </p:sp>
+      <p:sp>
+        <p:nvSpPr>
+          <p:cNvPr id="28" name="PlaceHolder 5"/>
           <p:cNvSpPr>
             <a:spLocks noGrp="1"/>
           </p:cNvSpPr>
@@ -385,8 +277,7 @@
           </a:prstGeom>
         </p:spPr>
         <p:txBody>
-          <a:bodyPr lIns="0" tIns="0" rIns="0" bIns="0"/>
-          <a:lstStyle/>
+          <a:bodyPr lIns="0" rIns="0" tIns="0" bIns="0"/>
           <a:p>
             <a:endParaRPr/>
           </a:p>
@@ -394,14 +285,11 @@
       </p:sp>
     </p:spTree>
   </p:cSld>
-  <p:clrMapOvr>
-    <a:masterClrMapping/>
-  </p:clrMapOvr>
 </p:sldLayout>
 </file>
 
 <file path=ppt/slideLayouts/slideLayout12.xml><?xml version="1.0" encoding="utf-8"?>
-<p:sldLayout xmlns:a="http://schemas.openxmlformats.org/drawingml/2006/main" xmlns:r="http://schemas.openxmlformats.org/officeDocument/2006/relationships" xmlns:p="http://schemas.openxmlformats.org/presentationml/2006/main" type="blank" preserve="1">
+<p:sldLayout xmlns:a="http://schemas.openxmlformats.org/drawingml/2006/main" xmlns:p="http://schemas.openxmlformats.org/presentationml/2006/main" xmlns:r="http://schemas.openxmlformats.org/officeDocument/2006/relationships" type="blank" preserve="1">
   <p:cSld name="Title, 6 Content">
     <p:spTree>
       <p:nvGrpSpPr>
@@ -419,7 +307,7 @@
       </p:grpSpPr>
       <p:sp>
         <p:nvSpPr>
-          <p:cNvPr id="31" name="PlaceHolder 1"/>
+          <p:cNvPr id="29" name="PlaceHolder 1"/>
           <p:cNvSpPr>
             <a:spLocks noGrp="1"/>
           </p:cNvSpPr>
@@ -430,15 +318,14 @@
         <p:spPr>
           <a:xfrm>
             <a:off x="457200" y="273600"/>
-            <a:ext cx="8229240" cy="1145160"/>
-          </a:xfrm>
-          <a:prstGeom prst="rect">
-            <a:avLst/>
-          </a:prstGeom>
-        </p:spPr>
-        <p:txBody>
-          <a:bodyPr lIns="0" tIns="0" rIns="0" bIns="0" anchor="ctr"/>
-          <a:lstStyle/>
+            <a:ext cx="8229240" cy="1144800"/>
+          </a:xfrm>
+          <a:prstGeom prst="rect">
+            <a:avLst/>
+          </a:prstGeom>
+        </p:spPr>
+        <p:txBody>
+          <a:bodyPr lIns="0" rIns="0" tIns="0" bIns="0" anchor="ctr"/>
           <a:p>
             <a:pPr algn="ctr"/>
             <a:endParaRPr/>
@@ -447,7 +334,7 @@
       </p:sp>
       <p:sp>
         <p:nvSpPr>
-          <p:cNvPr id="32" name="PlaceHolder 2"/>
+          <p:cNvPr id="30" name="PlaceHolder 2"/>
           <p:cNvSpPr>
             <a:spLocks noGrp="1"/>
           </p:cNvSpPr>
@@ -465,16 +352,15 @@
           </a:prstGeom>
         </p:spPr>
         <p:txBody>
-          <a:bodyPr lIns="0" tIns="0" rIns="0" bIns="0"/>
-          <a:lstStyle/>
-          <a:p>
-            <a:endParaRPr/>
-          </a:p>
-        </p:txBody>
-      </p:sp>
-      <p:sp>
-        <p:nvSpPr>
-          <p:cNvPr id="33" name="PlaceHolder 3"/>
+          <a:bodyPr lIns="0" rIns="0" tIns="0" bIns="0"/>
+          <a:p>
+            <a:endParaRPr/>
+          </a:p>
+        </p:txBody>
+      </p:sp>
+      <p:sp>
+        <p:nvSpPr>
+          <p:cNvPr id="31" name="PlaceHolder 3"/>
           <p:cNvSpPr>
             <a:spLocks noGrp="1"/>
           </p:cNvSpPr>
@@ -492,8 +378,7 @@
           </a:prstGeom>
         </p:spPr>
         <p:txBody>
-          <a:bodyPr lIns="0" tIns="0" rIns="0" bIns="0"/>
-          <a:lstStyle/>
+          <a:bodyPr lIns="0" rIns="0" tIns="0" bIns="0"/>
           <a:p>
             <a:endParaRPr/>
           </a:p>
@@ -501,20 +386,18 @@
       </p:sp>
       <p:pic>
         <p:nvPicPr>
-          <p:cNvPr id="34" name="Picture 33"/>
+          <p:cNvPr id="32" name="" descr=""/>
           <p:cNvPicPr/>
           <p:nvPr/>
         </p:nvPicPr>
         <p:blipFill>
           <a:blip r:embed="rId2"/>
-          <a:stretch>
-            <a:fillRect/>
-          </a:stretch>
+          <a:stretch/>
         </p:blipFill>
         <p:spPr>
           <a:xfrm>
-            <a:off x="2077920" y="1604520"/>
-            <a:ext cx="4987080" cy="3977280"/>
+            <a:off x="2078280" y="1604520"/>
+            <a:ext cx="4986720" cy="3977280"/>
           </a:xfrm>
           <a:prstGeom prst="rect">
             <a:avLst/>
@@ -526,20 +409,18 @@
       </p:pic>
       <p:pic>
         <p:nvPicPr>
-          <p:cNvPr id="35" name="Picture 34"/>
+          <p:cNvPr id="33" name="" descr=""/>
           <p:cNvPicPr/>
           <p:nvPr/>
         </p:nvPicPr>
         <p:blipFill>
-          <a:blip r:embed="rId2"/>
-          <a:stretch>
-            <a:fillRect/>
-          </a:stretch>
+          <a:blip r:embed="rId3"/>
+          <a:stretch/>
         </p:blipFill>
         <p:spPr>
           <a:xfrm>
-            <a:off x="2077920" y="1604520"/>
-            <a:ext cx="4987080" cy="3977280"/>
+            <a:off x="2078280" y="1604520"/>
+            <a:ext cx="4986720" cy="3977280"/>
           </a:xfrm>
           <a:prstGeom prst="rect">
             <a:avLst/>
@@ -551,14 +432,11 @@
       </p:pic>
     </p:spTree>
   </p:cSld>
-  <p:clrMapOvr>
-    <a:masterClrMapping/>
-  </p:clrMapOvr>
 </p:sldLayout>
 </file>
 
 <file path=ppt/slideLayouts/slideLayout2.xml><?xml version="1.0" encoding="utf-8"?>
-<p:sldLayout xmlns:a="http://schemas.openxmlformats.org/drawingml/2006/main" xmlns:r="http://schemas.openxmlformats.org/officeDocument/2006/relationships" xmlns:p="http://schemas.openxmlformats.org/presentationml/2006/main" type="tx" preserve="1">
+<p:sldLayout xmlns:a="http://schemas.openxmlformats.org/drawingml/2006/main" xmlns:p="http://schemas.openxmlformats.org/presentationml/2006/main" xmlns:r="http://schemas.openxmlformats.org/officeDocument/2006/relationships" type="tx" preserve="1">
   <p:cSld name="Title Slide">
     <p:spTree>
       <p:nvGrpSpPr>
@@ -576,7 +454,7 @@
       </p:grpSpPr>
       <p:sp>
         <p:nvSpPr>
-          <p:cNvPr id="2" name="PlaceHolder 1"/>
+          <p:cNvPr id="0" name="PlaceHolder 1"/>
           <p:cNvSpPr>
             <a:spLocks noGrp="1"/>
           </p:cNvSpPr>
@@ -587,15 +465,14 @@
         <p:spPr>
           <a:xfrm>
             <a:off x="457200" y="273600"/>
-            <a:ext cx="8229240" cy="1145160"/>
-          </a:xfrm>
-          <a:prstGeom prst="rect">
-            <a:avLst/>
-          </a:prstGeom>
-        </p:spPr>
-        <p:txBody>
-          <a:bodyPr lIns="0" tIns="0" rIns="0" bIns="0" anchor="ctr"/>
-          <a:lstStyle/>
+            <a:ext cx="8229240" cy="1144800"/>
+          </a:xfrm>
+          <a:prstGeom prst="rect">
+            <a:avLst/>
+          </a:prstGeom>
+        </p:spPr>
+        <p:txBody>
+          <a:bodyPr lIns="0" rIns="0" tIns="0" bIns="0" anchor="ctr"/>
           <a:p>
             <a:pPr algn="ctr"/>
             <a:endParaRPr/>
@@ -604,7 +481,7 @@
       </p:sp>
       <p:sp>
         <p:nvSpPr>
-          <p:cNvPr id="3" name="PlaceHolder 2"/>
+          <p:cNvPr id="1" name="PlaceHolder 2"/>
           <p:cNvSpPr>
             <a:spLocks noGrp="1"/>
           </p:cNvSpPr>
@@ -615,15 +492,14 @@
         <p:spPr>
           <a:xfrm>
             <a:off x="457200" y="1604520"/>
-            <a:ext cx="8229240" cy="3977640"/>
-          </a:xfrm>
-          <a:prstGeom prst="rect">
-            <a:avLst/>
-          </a:prstGeom>
-        </p:spPr>
-        <p:txBody>
-          <a:bodyPr lIns="0" tIns="0" rIns="0" bIns="0" anchor="ctr"/>
-          <a:lstStyle/>
+            <a:ext cx="8229240" cy="3977280"/>
+          </a:xfrm>
+          <a:prstGeom prst="rect">
+            <a:avLst/>
+          </a:prstGeom>
+        </p:spPr>
+        <p:txBody>
+          <a:bodyPr lIns="0" rIns="0" tIns="0" bIns="0" anchor="ctr"/>
           <a:p>
             <a:pPr algn="ctr"/>
             <a:endParaRPr/>
@@ -632,14 +508,11 @@
       </p:sp>
     </p:spTree>
   </p:cSld>
-  <p:clrMapOvr>
-    <a:masterClrMapping/>
-  </p:clrMapOvr>
 </p:sldLayout>
 </file>
 
 <file path=ppt/slideLayouts/slideLayout3.xml><?xml version="1.0" encoding="utf-8"?>
-<p:sldLayout xmlns:a="http://schemas.openxmlformats.org/drawingml/2006/main" xmlns:r="http://schemas.openxmlformats.org/officeDocument/2006/relationships" xmlns:p="http://schemas.openxmlformats.org/presentationml/2006/main" type="obj" preserve="1">
+<p:sldLayout xmlns:a="http://schemas.openxmlformats.org/drawingml/2006/main" xmlns:p="http://schemas.openxmlformats.org/presentationml/2006/main" xmlns:r="http://schemas.openxmlformats.org/officeDocument/2006/relationships" type="obj" preserve="1">
   <p:cSld name="Title, Content">
     <p:spTree>
       <p:nvGrpSpPr>
@@ -657,7 +530,7 @@
       </p:grpSpPr>
       <p:sp>
         <p:nvSpPr>
-          <p:cNvPr id="4" name="PlaceHolder 1"/>
+          <p:cNvPr id="2" name="PlaceHolder 1"/>
           <p:cNvSpPr>
             <a:spLocks noGrp="1"/>
           </p:cNvSpPr>
@@ -668,15 +541,14 @@
         <p:spPr>
           <a:xfrm>
             <a:off x="457200" y="273600"/>
-            <a:ext cx="8229240" cy="1145160"/>
-          </a:xfrm>
-          <a:prstGeom prst="rect">
-            <a:avLst/>
-          </a:prstGeom>
-        </p:spPr>
-        <p:txBody>
-          <a:bodyPr lIns="0" tIns="0" rIns="0" bIns="0" anchor="ctr"/>
-          <a:lstStyle/>
+            <a:ext cx="8229240" cy="1144800"/>
+          </a:xfrm>
+          <a:prstGeom prst="rect">
+            <a:avLst/>
+          </a:prstGeom>
+        </p:spPr>
+        <p:txBody>
+          <a:bodyPr lIns="0" rIns="0" tIns="0" bIns="0" anchor="ctr"/>
           <a:p>
             <a:pPr algn="ctr"/>
             <a:endParaRPr/>
@@ -685,7 +557,7 @@
       </p:sp>
       <p:sp>
         <p:nvSpPr>
-          <p:cNvPr id="5" name="PlaceHolder 2"/>
+          <p:cNvPr id="3" name="PlaceHolder 2"/>
           <p:cNvSpPr>
             <a:spLocks noGrp="1"/>
           </p:cNvSpPr>
@@ -703,8 +575,7 @@
           </a:prstGeom>
         </p:spPr>
         <p:txBody>
-          <a:bodyPr lIns="0" tIns="0" rIns="0" bIns="0"/>
-          <a:lstStyle/>
+          <a:bodyPr lIns="0" rIns="0" tIns="0" bIns="0"/>
           <a:p>
             <a:endParaRPr/>
           </a:p>
@@ -712,14 +583,11 @@
       </p:sp>
     </p:spTree>
   </p:cSld>
-  <p:clrMapOvr>
-    <a:masterClrMapping/>
-  </p:clrMapOvr>
 </p:sldLayout>
 </file>
 
 <file path=ppt/slideLayouts/slideLayout4.xml><?xml version="1.0" encoding="utf-8"?>
-<p:sldLayout xmlns:a="http://schemas.openxmlformats.org/drawingml/2006/main" xmlns:r="http://schemas.openxmlformats.org/officeDocument/2006/relationships" xmlns:p="http://schemas.openxmlformats.org/presentationml/2006/main" type="twoObj" preserve="1">
+<p:sldLayout xmlns:a="http://schemas.openxmlformats.org/drawingml/2006/main" xmlns:p="http://schemas.openxmlformats.org/presentationml/2006/main" xmlns:r="http://schemas.openxmlformats.org/officeDocument/2006/relationships" type="twoObj" preserve="1">
   <p:cSld name="Title, 2 Content">
     <p:spTree>
       <p:nvGrpSpPr>
@@ -737,7 +605,7 @@
       </p:grpSpPr>
       <p:sp>
         <p:nvSpPr>
-          <p:cNvPr id="6" name="PlaceHolder 1"/>
+          <p:cNvPr id="4" name="PlaceHolder 1"/>
           <p:cNvSpPr>
             <a:spLocks noGrp="1"/>
           </p:cNvSpPr>
@@ -748,15 +616,14 @@
         <p:spPr>
           <a:xfrm>
             <a:off x="457200" y="273600"/>
-            <a:ext cx="8229240" cy="1145160"/>
-          </a:xfrm>
-          <a:prstGeom prst="rect">
-            <a:avLst/>
-          </a:prstGeom>
-        </p:spPr>
-        <p:txBody>
-          <a:bodyPr lIns="0" tIns="0" rIns="0" bIns="0" anchor="ctr"/>
-          <a:lstStyle/>
+            <a:ext cx="8229240" cy="1144800"/>
+          </a:xfrm>
+          <a:prstGeom prst="rect">
+            <a:avLst/>
+          </a:prstGeom>
+        </p:spPr>
+        <p:txBody>
+          <a:bodyPr lIns="0" rIns="0" tIns="0" bIns="0" anchor="ctr"/>
           <a:p>
             <a:pPr algn="ctr"/>
             <a:endParaRPr/>
@@ -765,7 +632,7 @@
       </p:sp>
       <p:sp>
         <p:nvSpPr>
-          <p:cNvPr id="7" name="PlaceHolder 2"/>
+          <p:cNvPr id="5" name="PlaceHolder 2"/>
           <p:cNvSpPr>
             <a:spLocks noGrp="1"/>
           </p:cNvSpPr>
@@ -783,16 +650,15 @@
           </a:prstGeom>
         </p:spPr>
         <p:txBody>
-          <a:bodyPr lIns="0" tIns="0" rIns="0" bIns="0"/>
-          <a:lstStyle/>
-          <a:p>
-            <a:endParaRPr/>
-          </a:p>
-        </p:txBody>
-      </p:sp>
-      <p:sp>
-        <p:nvSpPr>
-          <p:cNvPr id="8" name="PlaceHolder 3"/>
+          <a:bodyPr lIns="0" rIns="0" tIns="0" bIns="0"/>
+          <a:p>
+            <a:endParaRPr/>
+          </a:p>
+        </p:txBody>
+      </p:sp>
+      <p:sp>
+        <p:nvSpPr>
+          <p:cNvPr id="6" name="PlaceHolder 3"/>
           <p:cNvSpPr>
             <a:spLocks noGrp="1"/>
           </p:cNvSpPr>
@@ -810,8 +676,7 @@
           </a:prstGeom>
         </p:spPr>
         <p:txBody>
-          <a:bodyPr lIns="0" tIns="0" rIns="0" bIns="0"/>
-          <a:lstStyle/>
+          <a:bodyPr lIns="0" rIns="0" tIns="0" bIns="0"/>
           <a:p>
             <a:endParaRPr/>
           </a:p>
@@ -819,14 +684,11 @@
       </p:sp>
     </p:spTree>
   </p:cSld>
-  <p:clrMapOvr>
-    <a:masterClrMapping/>
-  </p:clrMapOvr>
 </p:sldLayout>
 </file>
 
 <file path=ppt/slideLayouts/slideLayout5.xml><?xml version="1.0" encoding="utf-8"?>
-<p:sldLayout xmlns:a="http://schemas.openxmlformats.org/drawingml/2006/main" xmlns:r="http://schemas.openxmlformats.org/officeDocument/2006/relationships" xmlns:p="http://schemas.openxmlformats.org/presentationml/2006/main" type="titleOnly" preserve="1">
+<p:sldLayout xmlns:a="http://schemas.openxmlformats.org/drawingml/2006/main" xmlns:p="http://schemas.openxmlformats.org/presentationml/2006/main" xmlns:r="http://schemas.openxmlformats.org/officeDocument/2006/relationships" type="titleOnly" preserve="1">
   <p:cSld name="Title Only">
     <p:spTree>
       <p:nvGrpSpPr>
@@ -844,7 +706,7 @@
       </p:grpSpPr>
       <p:sp>
         <p:nvSpPr>
-          <p:cNvPr id="9" name="PlaceHolder 1"/>
+          <p:cNvPr id="7" name="PlaceHolder 1"/>
           <p:cNvSpPr>
             <a:spLocks noGrp="1"/>
           </p:cNvSpPr>
@@ -855,15 +717,14 @@
         <p:spPr>
           <a:xfrm>
             <a:off x="457200" y="273600"/>
-            <a:ext cx="8229240" cy="1145160"/>
-          </a:xfrm>
-          <a:prstGeom prst="rect">
-            <a:avLst/>
-          </a:prstGeom>
-        </p:spPr>
-        <p:txBody>
-          <a:bodyPr lIns="0" tIns="0" rIns="0" bIns="0" anchor="ctr"/>
-          <a:lstStyle/>
+            <a:ext cx="8229240" cy="1144800"/>
+          </a:xfrm>
+          <a:prstGeom prst="rect">
+            <a:avLst/>
+          </a:prstGeom>
+        </p:spPr>
+        <p:txBody>
+          <a:bodyPr lIns="0" rIns="0" tIns="0" bIns="0" anchor="ctr"/>
           <a:p>
             <a:pPr algn="ctr"/>
             <a:endParaRPr/>
@@ -872,14 +733,11 @@
       </p:sp>
     </p:spTree>
   </p:cSld>
-  <p:clrMapOvr>
-    <a:masterClrMapping/>
-  </p:clrMapOvr>
 </p:sldLayout>
 </file>
 
 <file path=ppt/slideLayouts/slideLayout6.xml><?xml version="1.0" encoding="utf-8"?>
-<p:sldLayout xmlns:a="http://schemas.openxmlformats.org/drawingml/2006/main" xmlns:r="http://schemas.openxmlformats.org/officeDocument/2006/relationships" xmlns:p="http://schemas.openxmlformats.org/presentationml/2006/main" type="objOnly" preserve="1">
+<p:sldLayout xmlns:a="http://schemas.openxmlformats.org/drawingml/2006/main" xmlns:p="http://schemas.openxmlformats.org/presentationml/2006/main" xmlns:r="http://schemas.openxmlformats.org/officeDocument/2006/relationships" type="objOnly" preserve="1">
   <p:cSld name="Centered Text">
     <p:spTree>
       <p:nvGrpSpPr>
@@ -897,7 +755,7 @@
       </p:grpSpPr>
       <p:sp>
         <p:nvSpPr>
-          <p:cNvPr id="10" name="PlaceHolder 1"/>
+          <p:cNvPr id="8" name="PlaceHolder 1"/>
           <p:cNvSpPr>
             <a:spLocks noGrp="1"/>
           </p:cNvSpPr>
@@ -908,15 +766,14 @@
         <p:spPr>
           <a:xfrm>
             <a:off x="457200" y="273600"/>
-            <a:ext cx="8229240" cy="5308200"/>
-          </a:xfrm>
-          <a:prstGeom prst="rect">
-            <a:avLst/>
-          </a:prstGeom>
-        </p:spPr>
-        <p:txBody>
-          <a:bodyPr lIns="0" tIns="0" rIns="0" bIns="0" anchor="ctr"/>
-          <a:lstStyle/>
+            <a:ext cx="8229240" cy="5307840"/>
+          </a:xfrm>
+          <a:prstGeom prst="rect">
+            <a:avLst/>
+          </a:prstGeom>
+        </p:spPr>
+        <p:txBody>
+          <a:bodyPr lIns="0" rIns="0" tIns="0" bIns="0" anchor="ctr"/>
           <a:p>
             <a:pPr algn="ctr"/>
             <a:endParaRPr/>
@@ -925,14 +782,11 @@
       </p:sp>
     </p:spTree>
   </p:cSld>
-  <p:clrMapOvr>
-    <a:masterClrMapping/>
-  </p:clrMapOvr>
 </p:sldLayout>
 </file>
 
 <file path=ppt/slideLayouts/slideLayout7.xml><?xml version="1.0" encoding="utf-8"?>
-<p:sldLayout xmlns:a="http://schemas.openxmlformats.org/drawingml/2006/main" xmlns:r="http://schemas.openxmlformats.org/officeDocument/2006/relationships" xmlns:p="http://schemas.openxmlformats.org/presentationml/2006/main" type="twoObjAndObj" preserve="1">
+<p:sldLayout xmlns:a="http://schemas.openxmlformats.org/drawingml/2006/main" xmlns:p="http://schemas.openxmlformats.org/presentationml/2006/main" xmlns:r="http://schemas.openxmlformats.org/officeDocument/2006/relationships" type="twoObjAndObj" preserve="1">
   <p:cSld name="Title, 2 Content and Content">
     <p:spTree>
       <p:nvGrpSpPr>
@@ -950,7 +804,7 @@
       </p:grpSpPr>
       <p:sp>
         <p:nvSpPr>
-          <p:cNvPr id="11" name="PlaceHolder 1"/>
+          <p:cNvPr id="9" name="PlaceHolder 1"/>
           <p:cNvSpPr>
             <a:spLocks noGrp="1"/>
           </p:cNvSpPr>
@@ -961,15 +815,14 @@
         <p:spPr>
           <a:xfrm>
             <a:off x="457200" y="273600"/>
-            <a:ext cx="8229240" cy="1145160"/>
-          </a:xfrm>
-          <a:prstGeom prst="rect">
-            <a:avLst/>
-          </a:prstGeom>
-        </p:spPr>
-        <p:txBody>
-          <a:bodyPr lIns="0" tIns="0" rIns="0" bIns="0" anchor="ctr"/>
-          <a:lstStyle/>
+            <a:ext cx="8229240" cy="1144800"/>
+          </a:xfrm>
+          <a:prstGeom prst="rect">
+            <a:avLst/>
+          </a:prstGeom>
+        </p:spPr>
+        <p:txBody>
+          <a:bodyPr lIns="0" rIns="0" tIns="0" bIns="0" anchor="ctr"/>
           <a:p>
             <a:pPr algn="ctr"/>
             <a:endParaRPr/>
@@ -978,7 +831,7 @@
       </p:sp>
       <p:sp>
         <p:nvSpPr>
-          <p:cNvPr id="12" name="PlaceHolder 2"/>
+          <p:cNvPr id="10" name="PlaceHolder 2"/>
           <p:cNvSpPr>
             <a:spLocks noGrp="1"/>
           </p:cNvSpPr>
@@ -996,16 +849,15 @@
           </a:prstGeom>
         </p:spPr>
         <p:txBody>
-          <a:bodyPr lIns="0" tIns="0" rIns="0" bIns="0"/>
-          <a:lstStyle/>
-          <a:p>
-            <a:endParaRPr/>
-          </a:p>
-        </p:txBody>
-      </p:sp>
-      <p:sp>
-        <p:nvSpPr>
-          <p:cNvPr id="13" name="PlaceHolder 3"/>
+          <a:bodyPr lIns="0" rIns="0" tIns="0" bIns="0"/>
+          <a:p>
+            <a:endParaRPr/>
+          </a:p>
+        </p:txBody>
+      </p:sp>
+      <p:sp>
+        <p:nvSpPr>
+          <p:cNvPr id="11" name="PlaceHolder 3"/>
           <p:cNvSpPr>
             <a:spLocks noGrp="1"/>
           </p:cNvSpPr>
@@ -1023,16 +875,15 @@
           </a:prstGeom>
         </p:spPr>
         <p:txBody>
-          <a:bodyPr lIns="0" tIns="0" rIns="0" bIns="0"/>
-          <a:lstStyle/>
-          <a:p>
-            <a:endParaRPr/>
-          </a:p>
-        </p:txBody>
-      </p:sp>
-      <p:sp>
-        <p:nvSpPr>
-          <p:cNvPr id="14" name="PlaceHolder 4"/>
+          <a:bodyPr lIns="0" rIns="0" tIns="0" bIns="0"/>
+          <a:p>
+            <a:endParaRPr/>
+          </a:p>
+        </p:txBody>
+      </p:sp>
+      <p:sp>
+        <p:nvSpPr>
+          <p:cNvPr id="12" name="PlaceHolder 4"/>
           <p:cNvSpPr>
             <a:spLocks noGrp="1"/>
           </p:cNvSpPr>
@@ -1050,8 +901,7 @@
           </a:prstGeom>
         </p:spPr>
         <p:txBody>
-          <a:bodyPr lIns="0" tIns="0" rIns="0" bIns="0"/>
-          <a:lstStyle/>
+          <a:bodyPr lIns="0" rIns="0" tIns="0" bIns="0"/>
           <a:p>
             <a:endParaRPr/>
           </a:p>
@@ -1059,14 +909,11 @@
       </p:sp>
     </p:spTree>
   </p:cSld>
-  <p:clrMapOvr>
-    <a:masterClrMapping/>
-  </p:clrMapOvr>
 </p:sldLayout>
 </file>
 
 <file path=ppt/slideLayouts/slideLayout8.xml><?xml version="1.0" encoding="utf-8"?>
-<p:sldLayout xmlns:a="http://schemas.openxmlformats.org/drawingml/2006/main" xmlns:r="http://schemas.openxmlformats.org/officeDocument/2006/relationships" xmlns:p="http://schemas.openxmlformats.org/presentationml/2006/main" type="objAndTwoObj" preserve="1">
+<p:sldLayout xmlns:a="http://schemas.openxmlformats.org/drawingml/2006/main" xmlns:p="http://schemas.openxmlformats.org/presentationml/2006/main" xmlns:r="http://schemas.openxmlformats.org/officeDocument/2006/relationships" type="objAndTwoObj" preserve="1">
   <p:cSld name="Title Content and 2 Content">
     <p:spTree>
       <p:nvGrpSpPr>
@@ -1084,7 +931,7 @@
       </p:grpSpPr>
       <p:sp>
         <p:nvSpPr>
-          <p:cNvPr id="15" name="PlaceHolder 1"/>
+          <p:cNvPr id="13" name="PlaceHolder 1"/>
           <p:cNvSpPr>
             <a:spLocks noGrp="1"/>
           </p:cNvSpPr>
@@ -1095,15 +942,14 @@
         <p:spPr>
           <a:xfrm>
             <a:off x="457200" y="273600"/>
-            <a:ext cx="8229240" cy="1145160"/>
-          </a:xfrm>
-          <a:prstGeom prst="rect">
-            <a:avLst/>
-          </a:prstGeom>
-        </p:spPr>
-        <p:txBody>
-          <a:bodyPr lIns="0" tIns="0" rIns="0" bIns="0" anchor="ctr"/>
-          <a:lstStyle/>
+            <a:ext cx="8229240" cy="1144800"/>
+          </a:xfrm>
+          <a:prstGeom prst="rect">
+            <a:avLst/>
+          </a:prstGeom>
+        </p:spPr>
+        <p:txBody>
+          <a:bodyPr lIns="0" rIns="0" tIns="0" bIns="0" anchor="ctr"/>
           <a:p>
             <a:pPr algn="ctr"/>
             <a:endParaRPr/>
@@ -1112,7 +958,7 @@
       </p:sp>
       <p:sp>
         <p:nvSpPr>
-          <p:cNvPr id="16" name="PlaceHolder 2"/>
+          <p:cNvPr id="14" name="PlaceHolder 2"/>
           <p:cNvSpPr>
             <a:spLocks noGrp="1"/>
           </p:cNvSpPr>
@@ -1130,16 +976,15 @@
           </a:prstGeom>
         </p:spPr>
         <p:txBody>
-          <a:bodyPr lIns="0" tIns="0" rIns="0" bIns="0"/>
-          <a:lstStyle/>
-          <a:p>
-            <a:endParaRPr/>
-          </a:p>
-        </p:txBody>
-      </p:sp>
-      <p:sp>
-        <p:nvSpPr>
-          <p:cNvPr id="17" name="PlaceHolder 3"/>
+          <a:bodyPr lIns="0" rIns="0" tIns="0" bIns="0"/>
+          <a:p>
+            <a:endParaRPr/>
+          </a:p>
+        </p:txBody>
+      </p:sp>
+      <p:sp>
+        <p:nvSpPr>
+          <p:cNvPr id="15" name="PlaceHolder 3"/>
           <p:cNvSpPr>
             <a:spLocks noGrp="1"/>
           </p:cNvSpPr>
@@ -1157,16 +1002,15 @@
           </a:prstGeom>
         </p:spPr>
         <p:txBody>
-          <a:bodyPr lIns="0" tIns="0" rIns="0" bIns="0"/>
-          <a:lstStyle/>
-          <a:p>
-            <a:endParaRPr/>
-          </a:p>
-        </p:txBody>
-      </p:sp>
-      <p:sp>
-        <p:nvSpPr>
-          <p:cNvPr id="18" name="PlaceHolder 4"/>
+          <a:bodyPr lIns="0" rIns="0" tIns="0" bIns="0"/>
+          <a:p>
+            <a:endParaRPr/>
+          </a:p>
+        </p:txBody>
+      </p:sp>
+      <p:sp>
+        <p:nvSpPr>
+          <p:cNvPr id="16" name="PlaceHolder 4"/>
           <p:cNvSpPr>
             <a:spLocks noGrp="1"/>
           </p:cNvSpPr>
@@ -1184,8 +1028,7 @@
           </a:prstGeom>
         </p:spPr>
         <p:txBody>
-          <a:bodyPr lIns="0" tIns="0" rIns="0" bIns="0"/>
-          <a:lstStyle/>
+          <a:bodyPr lIns="0" rIns="0" tIns="0" bIns="0"/>
           <a:p>
             <a:endParaRPr/>
           </a:p>
@@ -1193,14 +1036,11 @@
       </p:sp>
     </p:spTree>
   </p:cSld>
-  <p:clrMapOvr>
-    <a:masterClrMapping/>
-  </p:clrMapOvr>
 </p:sldLayout>
 </file>
 
 <file path=ppt/slideLayouts/slideLayout9.xml><?xml version="1.0" encoding="utf-8"?>
-<p:sldLayout xmlns:a="http://schemas.openxmlformats.org/drawingml/2006/main" xmlns:r="http://schemas.openxmlformats.org/officeDocument/2006/relationships" xmlns:p="http://schemas.openxmlformats.org/presentationml/2006/main" type="twoObjOverTx" preserve="1">
+<p:sldLayout xmlns:a="http://schemas.openxmlformats.org/drawingml/2006/main" xmlns:p="http://schemas.openxmlformats.org/presentationml/2006/main" xmlns:r="http://schemas.openxmlformats.org/officeDocument/2006/relationships" type="twoObjOverTx" preserve="1">
   <p:cSld name="Title, 2 Content over Content">
     <p:spTree>
       <p:nvGrpSpPr>
@@ -1218,7 +1058,7 @@
       </p:grpSpPr>
       <p:sp>
         <p:nvSpPr>
-          <p:cNvPr id="19" name="PlaceHolder 1"/>
+          <p:cNvPr id="17" name="PlaceHolder 1"/>
           <p:cNvSpPr>
             <a:spLocks noGrp="1"/>
           </p:cNvSpPr>
@@ -1229,15 +1069,14 @@
         <p:spPr>
           <a:xfrm>
             <a:off x="457200" y="273600"/>
-            <a:ext cx="8229240" cy="1145160"/>
-          </a:xfrm>
-          <a:prstGeom prst="rect">
-            <a:avLst/>
-          </a:prstGeom>
-        </p:spPr>
-        <p:txBody>
-          <a:bodyPr lIns="0" tIns="0" rIns="0" bIns="0" anchor="ctr"/>
-          <a:lstStyle/>
+            <a:ext cx="8229240" cy="1144800"/>
+          </a:xfrm>
+          <a:prstGeom prst="rect">
+            <a:avLst/>
+          </a:prstGeom>
+        </p:spPr>
+        <p:txBody>
+          <a:bodyPr lIns="0" rIns="0" tIns="0" bIns="0" anchor="ctr"/>
           <a:p>
             <a:pPr algn="ctr"/>
             <a:endParaRPr/>
@@ -1246,7 +1085,7 @@
       </p:sp>
       <p:sp>
         <p:nvSpPr>
-          <p:cNvPr id="20" name="PlaceHolder 2"/>
+          <p:cNvPr id="18" name="PlaceHolder 2"/>
           <p:cNvSpPr>
             <a:spLocks noGrp="1"/>
           </p:cNvSpPr>
@@ -1264,16 +1103,15 @@
           </a:prstGeom>
         </p:spPr>
         <p:txBody>
-          <a:bodyPr lIns="0" tIns="0" rIns="0" bIns="0"/>
-          <a:lstStyle/>
-          <a:p>
-            <a:endParaRPr/>
-          </a:p>
-        </p:txBody>
-      </p:sp>
-      <p:sp>
-        <p:nvSpPr>
-          <p:cNvPr id="21" name="PlaceHolder 3"/>
+          <a:bodyPr lIns="0" rIns="0" tIns="0" bIns="0"/>
+          <a:p>
+            <a:endParaRPr/>
+          </a:p>
+        </p:txBody>
+      </p:sp>
+      <p:sp>
+        <p:nvSpPr>
+          <p:cNvPr id="19" name="PlaceHolder 3"/>
           <p:cNvSpPr>
             <a:spLocks noGrp="1"/>
           </p:cNvSpPr>
@@ -1291,16 +1129,15 @@
           </a:prstGeom>
         </p:spPr>
         <p:txBody>
-          <a:bodyPr lIns="0" tIns="0" rIns="0" bIns="0"/>
-          <a:lstStyle/>
-          <a:p>
-            <a:endParaRPr/>
-          </a:p>
-        </p:txBody>
-      </p:sp>
-      <p:sp>
-        <p:nvSpPr>
-          <p:cNvPr id="22" name="PlaceHolder 4"/>
+          <a:bodyPr lIns="0" rIns="0" tIns="0" bIns="0"/>
+          <a:p>
+            <a:endParaRPr/>
+          </a:p>
+        </p:txBody>
+      </p:sp>
+      <p:sp>
+        <p:nvSpPr>
+          <p:cNvPr id="20" name="PlaceHolder 4"/>
           <p:cNvSpPr>
             <a:spLocks noGrp="1"/>
           </p:cNvSpPr>
@@ -1318,8 +1155,7 @@
           </a:prstGeom>
         </p:spPr>
         <p:txBody>
-          <a:bodyPr lIns="0" tIns="0" rIns="0" bIns="0"/>
-          <a:lstStyle/>
+          <a:bodyPr lIns="0" rIns="0" tIns="0" bIns="0"/>
           <a:p>
             <a:endParaRPr/>
           </a:p>
@@ -1327,21 +1163,17 @@
       </p:sp>
     </p:spTree>
   </p:cSld>
-  <p:clrMapOvr>
-    <a:masterClrMapping/>
-  </p:clrMapOvr>
 </p:sldLayout>
 </file>
 
 <file path=ppt/slideMasters/slideMaster1.xml><?xml version="1.0" encoding="utf-8"?>
-<p:sldMaster xmlns:a="http://schemas.openxmlformats.org/drawingml/2006/main" xmlns:r="http://schemas.openxmlformats.org/officeDocument/2006/relationships" xmlns:p="http://schemas.openxmlformats.org/presentationml/2006/main">
+<p:sldMaster xmlns:a="http://schemas.openxmlformats.org/drawingml/2006/main" xmlns:p="http://schemas.openxmlformats.org/presentationml/2006/main" xmlns:r="http://schemas.openxmlformats.org/officeDocument/2006/relationships">
   <p:cSld>
     <p:bg>
       <p:bgPr>
         <a:solidFill>
-          <a:srgbClr val="FFFFFF"/>
+          <a:srgbClr val="ffffff"/>
         </a:solidFill>
-        <a:effectLst/>
       </p:bgPr>
     </p:bg>
     <p:spTree>
@@ -1358,189 +1190,28 @@
           <a:chExt cx="0" cy="0"/>
         </a:xfrm>
       </p:grpSpPr>
-      <p:sp>
-        <p:nvSpPr>
-          <p:cNvPr id="2" name="PlaceHolder 1"/>
-          <p:cNvSpPr>
-            <a:spLocks noGrp="1"/>
-          </p:cNvSpPr>
-          <p:nvPr>
-            <p:ph type="title"/>
-          </p:nvPr>
-        </p:nvSpPr>
-        <p:spPr>
-          <a:xfrm>
-            <a:off x="457200" y="273600"/>
-            <a:ext cx="8229240" cy="1144800"/>
-          </a:xfrm>
-          <a:prstGeom prst="rect">
-            <a:avLst/>
-          </a:prstGeom>
-        </p:spPr>
-        <p:txBody>
-          <a:bodyPr lIns="0" tIns="0" rIns="0" bIns="0" anchor="ctr"/>
-          <a:lstStyle/>
-          <a:p>
-            <a:pPr algn="ctr"/>
-            <a:r>
-              <a:rPr lang="en-US" sz="4400">
-                <a:latin typeface="Arial"/>
-              </a:rPr>
-              <a:t>Click to edit the title text format</a:t>
-            </a:r>
-            <a:endParaRPr/>
-          </a:p>
-        </p:txBody>
-      </p:sp>
-      <p:sp>
-        <p:nvSpPr>
-          <p:cNvPr id="3" name="PlaceHolder 2"/>
-          <p:cNvSpPr>
-            <a:spLocks noGrp="1"/>
-          </p:cNvSpPr>
-          <p:nvPr>
-            <p:ph type="body"/>
-          </p:nvPr>
-        </p:nvSpPr>
-        <p:spPr>
-          <a:xfrm>
-            <a:off x="457200" y="1604520"/>
-            <a:ext cx="8229240" cy="3977280"/>
-          </a:xfrm>
-          <a:prstGeom prst="rect">
-            <a:avLst/>
-          </a:prstGeom>
-        </p:spPr>
-        <p:txBody>
-          <a:bodyPr lIns="0" tIns="0" rIns="0" bIns="0"/>
-          <a:lstStyle/>
-          <a:p>
-            <a:pPr>
-              <a:buSzPct val="45000"/>
-              <a:buFont typeface="StarSymbol"/>
-              <a:buChar char=""/>
-            </a:pPr>
-            <a:r>
-              <a:rPr lang="en-US" sz="3200">
-                <a:latin typeface="Arial"/>
-              </a:rPr>
-              <a:t>Click to edit the outline text format</a:t>
-            </a:r>
-            <a:endParaRPr/>
-          </a:p>
-          <a:p>
-            <a:pPr lvl="1">
-              <a:buSzPct val="75000"/>
-              <a:buFont typeface="StarSymbol"/>
-              <a:buChar char=""/>
-            </a:pPr>
-            <a:r>
-              <a:rPr lang="en-US" sz="2800">
-                <a:latin typeface="Arial"/>
-              </a:rPr>
-              <a:t>Second Outline Level</a:t>
-            </a:r>
-            <a:endParaRPr/>
-          </a:p>
-          <a:p>
-            <a:pPr lvl="2">
-              <a:buSzPct val="45000"/>
-              <a:buFont typeface="StarSymbol"/>
-              <a:buChar char=""/>
-            </a:pPr>
-            <a:r>
-              <a:rPr lang="en-US" sz="2400">
-                <a:latin typeface="Arial"/>
-              </a:rPr>
-              <a:t>Third Outline Level</a:t>
-            </a:r>
-            <a:endParaRPr/>
-          </a:p>
-          <a:p>
-            <a:pPr lvl="3">
-              <a:buSzPct val="75000"/>
-              <a:buFont typeface="StarSymbol"/>
-              <a:buChar char=""/>
-            </a:pPr>
-            <a:r>
-              <a:rPr lang="en-US" sz="2000">
-                <a:latin typeface="Arial"/>
-              </a:rPr>
-              <a:t>Fourth Outline Level</a:t>
-            </a:r>
-            <a:endParaRPr/>
-          </a:p>
-          <a:p>
-            <a:pPr lvl="4">
-              <a:buSzPct val="45000"/>
-              <a:buFont typeface="StarSymbol"/>
-              <a:buChar char=""/>
-            </a:pPr>
-            <a:r>
-              <a:rPr lang="en-US" sz="2000">
-                <a:latin typeface="Arial"/>
-              </a:rPr>
-              <a:t>Fifth Outline Level</a:t>
-            </a:r>
-            <a:endParaRPr/>
-          </a:p>
-          <a:p>
-            <a:pPr lvl="5">
-              <a:buSzPct val="45000"/>
-              <a:buFont typeface="StarSymbol"/>
-              <a:buChar char=""/>
-            </a:pPr>
-            <a:r>
-              <a:rPr lang="en-US" sz="2000">
-                <a:latin typeface="Arial"/>
-              </a:rPr>
-              <a:t>Sixth Outline Level</a:t>
-            </a:r>
-            <a:endParaRPr/>
-          </a:p>
-          <a:p>
-            <a:pPr lvl="6">
-              <a:buSzPct val="45000"/>
-              <a:buFont typeface="StarSymbol"/>
-              <a:buChar char=""/>
-            </a:pPr>
-            <a:r>
-              <a:rPr lang="en-US" sz="2000">
-                <a:latin typeface="Arial"/>
-              </a:rPr>
-              <a:t>Seventh Outline Level</a:t>
-            </a:r>
-            <a:endParaRPr/>
-          </a:p>
-        </p:txBody>
-      </p:sp>
     </p:spTree>
   </p:cSld>
-  <p:clrMap bg1="lt1" tx1="dk1" bg2="lt2" tx2="dk2" accent1="accent1" accent2="accent2" accent3="accent3" accent4="accent4" accent5="accent5" accent6="accent6" hlink="hlink" folHlink="folHlink"/>
+  <p:clrMap bg1="lt1" bg2="lt2" tx1="dk1" tx2="dk2" accent1="accent1" accent2="accent2" accent3="accent3" accent4="accent4" accent5="accent5" accent6="accent6" hlink="hlink" folHlink="folHlink"/>
   <p:sldLayoutIdLst>
-    <p:sldLayoutId id="2147483649" r:id="rId1"/>
-    <p:sldLayoutId id="2147483650" r:id="rId2"/>
-    <p:sldLayoutId id="2147483651" r:id="rId3"/>
-    <p:sldLayoutId id="2147483652" r:id="rId4"/>
-    <p:sldLayoutId id="2147483653" r:id="rId5"/>
-    <p:sldLayoutId id="2147483654" r:id="rId6"/>
-    <p:sldLayoutId id="2147483655" r:id="rId7"/>
-    <p:sldLayoutId id="2147483656" r:id="rId8"/>
-    <p:sldLayoutId id="2147483657" r:id="rId9"/>
-    <p:sldLayoutId id="2147483658" r:id="rId10"/>
-    <p:sldLayoutId id="2147483659" r:id="rId11"/>
-    <p:sldLayoutId id="2147483660" r:id="rId12"/>
+    <p:sldLayoutId id="2147483649" r:id="rId2"/>
+    <p:sldLayoutId id="2147483650" r:id="rId3"/>
+    <p:sldLayoutId id="2147483651" r:id="rId4"/>
+    <p:sldLayoutId id="2147483652" r:id="rId5"/>
+    <p:sldLayoutId id="2147483653" r:id="rId6"/>
+    <p:sldLayoutId id="2147483654" r:id="rId7"/>
+    <p:sldLayoutId id="2147483655" r:id="rId8"/>
+    <p:sldLayoutId id="2147483656" r:id="rId9"/>
+    <p:sldLayoutId id="2147483657" r:id="rId10"/>
+    <p:sldLayoutId id="2147483658" r:id="rId11"/>
+    <p:sldLayoutId id="2147483659" r:id="rId12"/>
+    <p:sldLayoutId id="2147483660" r:id="rId13"/>
   </p:sldLayoutIdLst>
-  <p:txStyles>
-    <p:titleStyle/>
-    <p:bodyStyle/>
-    <p:otherStyle/>
-  </p:txStyles>
 </p:sldMaster>
 </file>
 
 <file path=ppt/slides/slide1.xml><?xml version="1.0" encoding="utf-8"?>
-<p:sld xmlns:a="http://schemas.openxmlformats.org/drawingml/2006/main" xmlns:r="http://schemas.openxmlformats.org/officeDocument/2006/relationships" xmlns:p="http://schemas.openxmlformats.org/presentationml/2006/main">
+<p:sld xmlns:a="http://schemas.openxmlformats.org/drawingml/2006/main" xmlns:p="http://schemas.openxmlformats.org/presentationml/2006/main" xmlns:r="http://schemas.openxmlformats.org/officeDocument/2006/relationships">
   <p:cSld>
     <p:spTree>
       <p:nvGrpSpPr>
@@ -1558,31 +1229,36 @@
       </p:grpSpPr>
       <p:sp>
         <p:nvSpPr>
-          <p:cNvPr id="36" name="CustomShape 1"/>
+          <p:cNvPr id="34" name="CustomShape 1"/>
           <p:cNvSpPr/>
           <p:nvPr/>
         </p:nvSpPr>
         <p:spPr>
           <a:xfrm>
-            <a:off x="2362200" y="2362320"/>
-            <a:ext cx="3809160" cy="1065960"/>
+            <a:off x="2362320" y="2362320"/>
+            <a:ext cx="3808080" cy="1064880"/>
           </a:xfrm>
           <a:prstGeom prst="ellipse">
             <a:avLst/>
           </a:prstGeom>
           <a:solidFill>
-            <a:srgbClr val="FFFF00"/>
+            <a:srgbClr val="ffff00"/>
           </a:solidFill>
           <a:ln w="25560">
             <a:solidFill>
-              <a:srgbClr val="3A5F8B"/>
+              <a:srgbClr val="3a5f8b"/>
             </a:solidFill>
             <a:round/>
           </a:ln>
         </p:spPr>
-        <p:txBody>
-          <a:bodyPr lIns="90000" tIns="45000" rIns="90000" bIns="45000" anchor="ctr"/>
-          <a:lstStyle/>
+        <p:style>
+          <a:lnRef idx="0"/>
+          <a:fillRef idx="0"/>
+          <a:effectRef idx="0"/>
+          <a:fontRef idx="minor"/>
+        </p:style>
+        <p:txBody>
+          <a:bodyPr lIns="90000" rIns="90000" tIns="45000" bIns="45000" anchor="ctr"/>
           <a:p>
             <a:pPr algn="ctr">
               <a:lnSpc>
@@ -1590,11 +1266,12 @@
               </a:lnSpc>
             </a:pPr>
             <a:r>
-              <a:rPr lang="en-US">
+              <a:rPr lang="en-US" strike="noStrike">
                 <a:solidFill>
                   <a:srgbClr val="000000"/>
                 </a:solidFill>
                 <a:latin typeface="Calibri"/>
+                <a:ea typeface="DejaVu Sans"/>
               </a:rPr>
               <a:t>oss_package_analysis.py</a:t>
             </a:r>
@@ -1604,14 +1281,14 @@
       </p:sp>
       <p:sp>
         <p:nvSpPr>
-          <p:cNvPr id="37" name="CustomShape 2"/>
+          <p:cNvPr id="35" name="CustomShape 2"/>
           <p:cNvSpPr/>
           <p:nvPr/>
         </p:nvSpPr>
         <p:spPr>
           <a:xfrm>
-            <a:off x="2819400" y="1051920"/>
-            <a:ext cx="2855880" cy="685080"/>
+            <a:off x="2743200" y="1051920"/>
+            <a:ext cx="3017160" cy="684000"/>
           </a:xfrm>
           <a:prstGeom prst="rect">
             <a:avLst/>
@@ -1621,14 +1298,19 @@
           </a:solidFill>
           <a:ln w="25560">
             <a:solidFill>
-              <a:srgbClr val="3A5F8B"/>
+              <a:srgbClr val="3a5f8b"/>
             </a:solidFill>
             <a:round/>
           </a:ln>
         </p:spPr>
-        <p:txBody>
-          <a:bodyPr lIns="90000" tIns="45000" rIns="90000" bIns="45000" anchor="ctr"/>
-          <a:lstStyle/>
+        <p:style>
+          <a:lnRef idx="0"/>
+          <a:fillRef idx="0"/>
+          <a:effectRef idx="0"/>
+          <a:fontRef idx="minor"/>
+        </p:style>
+        <p:txBody>
+          <a:bodyPr lIns="90000" rIns="90000" tIns="45000" bIns="45000" anchor="ctr"/>
           <a:p>
             <a:pPr algn="ctr">
               <a:lnSpc>
@@ -1636,28 +1318,29 @@
               </a:lnSpc>
             </a:pPr>
             <a:r>
-              <a:rPr lang="en-US" dirty="0">
+              <a:rPr lang="en-US" strike="noStrike">
                 <a:solidFill>
-                  <a:srgbClr val="FFFFFF"/>
+                  <a:srgbClr val="ffffff"/>
                 </a:solidFill>
                 <a:latin typeface="Calibri"/>
+                <a:ea typeface="DejaVu Sans"/>
               </a:rPr>
               <a:t>projects_to_examine.csv</a:t>
             </a:r>
-            <a:endParaRPr dirty="0"/>
-          </a:p>
-        </p:txBody>
-      </p:sp>
-      <p:sp>
-        <p:nvSpPr>
-          <p:cNvPr id="39" name="CustomShape 4"/>
+            <a:endParaRPr/>
+          </a:p>
+        </p:txBody>
+      </p:sp>
+      <p:sp>
+        <p:nvSpPr>
+          <p:cNvPr id="36" name="CustomShape 3"/>
           <p:cNvSpPr/>
           <p:nvPr/>
         </p:nvSpPr>
         <p:spPr>
           <a:xfrm>
             <a:off x="1740600" y="274320"/>
-            <a:ext cx="5665680" cy="637920"/>
+            <a:ext cx="5664600" cy="636840"/>
           </a:xfrm>
           <a:prstGeom prst="rect">
             <a:avLst/>
@@ -1667,9 +1350,144 @@
             <a:noFill/>
           </a:ln>
         </p:spPr>
-        <p:txBody>
-          <a:bodyPr wrap="none" lIns="90000" tIns="45000" rIns="90000" bIns="45000"/>
-          <a:lstStyle/>
+        <p:style>
+          <a:lnRef idx="0"/>
+          <a:fillRef idx="0"/>
+          <a:effectRef idx="0"/>
+          <a:fontRef idx="minor"/>
+        </p:style>
+      </p:sp>
+      <p:sp>
+        <p:nvSpPr>
+          <p:cNvPr id="37" name="CustomShape 4"/>
+          <p:cNvSpPr/>
+          <p:nvPr/>
+        </p:nvSpPr>
+        <p:spPr>
+          <a:xfrm>
+            <a:off x="3095280" y="5885640"/>
+            <a:ext cx="2207880" cy="455400"/>
+          </a:xfrm>
+          <a:prstGeom prst="rect">
+            <a:avLst/>
+          </a:prstGeom>
+          <a:solidFill>
+            <a:srgbClr val="ff0000"/>
+          </a:solidFill>
+          <a:ln w="25560">
+            <a:solidFill>
+              <a:srgbClr val="3a5f8b"/>
+            </a:solidFill>
+            <a:round/>
+          </a:ln>
+        </p:spPr>
+        <p:style>
+          <a:lnRef idx="0"/>
+          <a:fillRef idx="0"/>
+          <a:effectRef idx="0"/>
+          <a:fontRef idx="minor"/>
+        </p:style>
+        <p:txBody>
+          <a:bodyPr lIns="90000" rIns="90000" tIns="45000" bIns="45000" anchor="ctr"/>
+          <a:p>
+            <a:pPr algn="ctr">
+              <a:lnSpc>
+                <a:spcPct val="100000"/>
+              </a:lnSpc>
+            </a:pPr>
+            <a:r>
+              <a:rPr lang="en-US" strike="noStrike">
+                <a:solidFill>
+                  <a:srgbClr val="ffffff"/>
+                </a:solidFill>
+                <a:latin typeface="Calibri"/>
+                <a:ea typeface="DejaVu Sans"/>
+              </a:rPr>
+              <a:t>results.csv</a:t>
+            </a:r>
+            <a:endParaRPr/>
+          </a:p>
+        </p:txBody>
+      </p:sp>
+      <p:sp>
+        <p:nvSpPr>
+          <p:cNvPr id="38" name="CustomShape 5"/>
+          <p:cNvSpPr/>
+          <p:nvPr/>
+        </p:nvSpPr>
+        <p:spPr>
+          <a:xfrm>
+            <a:off x="100800" y="4023360"/>
+            <a:ext cx="2642040" cy="684000"/>
+          </a:xfrm>
+          <a:prstGeom prst="rect">
+            <a:avLst/>
+          </a:prstGeom>
+          <a:solidFill>
+            <a:srgbClr val="1f497d"/>
+          </a:solidFill>
+          <a:ln w="25560">
+            <a:solidFill>
+              <a:srgbClr val="3a5f8b"/>
+            </a:solidFill>
+            <a:round/>
+          </a:ln>
+        </p:spPr>
+        <p:style>
+          <a:lnRef idx="0"/>
+          <a:fillRef idx="0"/>
+          <a:effectRef idx="0"/>
+          <a:fontRef idx="minor"/>
+        </p:style>
+        <p:txBody>
+          <a:bodyPr lIns="90000" rIns="90000" tIns="45000" bIns="45000" anchor="ctr"/>
+          <a:p>
+            <a:pPr algn="ctr">
+              <a:lnSpc>
+                <a:spcPct val="100000"/>
+              </a:lnSpc>
+            </a:pPr>
+            <a:r>
+              <a:rPr lang="en-US" strike="noStrike">
+                <a:solidFill>
+                  <a:srgbClr val="ffffff"/>
+                </a:solidFill>
+                <a:latin typeface="Calibri"/>
+                <a:ea typeface="DejaVu Sans"/>
+              </a:rPr>
+              <a:t>apt_cache_dumpavail.txt</a:t>
+            </a:r>
+            <a:endParaRPr/>
+          </a:p>
+        </p:txBody>
+      </p:sp>
+      <p:sp>
+        <p:nvSpPr>
+          <p:cNvPr id="39" name="CustomShape 6"/>
+          <p:cNvSpPr/>
+          <p:nvPr/>
+        </p:nvSpPr>
+        <p:spPr>
+          <a:xfrm>
+            <a:off x="182880" y="4757040"/>
+            <a:ext cx="2255400" cy="363240"/>
+          </a:xfrm>
+          <a:prstGeom prst="rect">
+            <a:avLst/>
+          </a:prstGeom>
+          <a:noFill/>
+          <a:ln>
+            <a:noFill/>
+          </a:ln>
+        </p:spPr>
+        <p:style>
+          <a:lnRef idx="0"/>
+          <a:fillRef idx="0"/>
+          <a:effectRef idx="0"/>
+          <a:fontRef idx="minor"/>
+        </p:style>
+        <p:txBody>
+          <a:bodyPr wrap="none" lIns="90000" rIns="90000" tIns="45000" bIns="45000"/>
           <a:p>
             <a:pPr>
               <a:lnSpc>
@@ -1677,16 +1495,145 @@
               </a:lnSpc>
             </a:pPr>
             <a:r>
-              <a:rPr lang="en-US" i="1">
+              <a:rPr lang="en-US" strike="noStrike">
                 <a:solidFill>
                   <a:srgbClr val="000000"/>
                 </a:solidFill>
                 <a:latin typeface="Calibri"/>
+                <a:ea typeface="DejaVu Sans"/>
               </a:rPr>
-              <a:t>File with projects to analyze with corresponding</a:t>
+              <a:t>get_debian()</a:t>
             </a:r>
             <a:endParaRPr/>
           </a:p>
+        </p:txBody>
+      </p:sp>
+      <p:sp>
+        <p:nvSpPr>
+          <p:cNvPr id="40" name="CustomShape 7"/>
+          <p:cNvSpPr/>
+          <p:nvPr/>
+        </p:nvSpPr>
+        <p:spPr>
+          <a:xfrm>
+            <a:off x="6478560" y="2067480"/>
+            <a:ext cx="2481120" cy="363240"/>
+          </a:xfrm>
+          <a:prstGeom prst="rect">
+            <a:avLst/>
+          </a:prstGeom>
+          <a:noFill/>
+          <a:ln>
+            <a:noFill/>
+          </a:ln>
+        </p:spPr>
+        <p:style>
+          <a:lnRef idx="0"/>
+          <a:fillRef idx="0"/>
+          <a:effectRef idx="0"/>
+          <a:fontRef idx="minor"/>
+        </p:style>
+        <p:txBody>
+          <a:bodyPr wrap="none" lIns="90000" rIns="90000" tIns="45000" bIns="45000"/>
+          <a:p>
+            <a:pPr>
+              <a:lnSpc>
+                <a:spcPct val="100000"/>
+              </a:lnSpc>
+            </a:pPr>
+            <a:r>
+              <a:rPr lang="en-US" strike="noStrike">
+                <a:solidFill>
+                  <a:srgbClr val="000000"/>
+                </a:solidFill>
+                <a:latin typeface="Calibri"/>
+                <a:ea typeface="DejaVu Sans"/>
+              </a:rPr>
+              <a:t>get_openhub()</a:t>
+            </a:r>
+            <a:endParaRPr/>
+          </a:p>
+        </p:txBody>
+      </p:sp>
+      <p:sp>
+        <p:nvSpPr>
+          <p:cNvPr id="41" name="CustomShape 8"/>
+          <p:cNvSpPr/>
+          <p:nvPr/>
+        </p:nvSpPr>
+        <p:spPr>
+          <a:xfrm>
+            <a:off x="6807960" y="4480920"/>
+            <a:ext cx="1877400" cy="363960"/>
+          </a:xfrm>
+          <a:prstGeom prst="rect">
+            <a:avLst/>
+          </a:prstGeom>
+          <a:noFill/>
+          <a:ln>
+            <a:noFill/>
+          </a:ln>
+        </p:spPr>
+        <p:style>
+          <a:lnRef idx="0"/>
+          <a:fillRef idx="0"/>
+          <a:effectRef idx="0"/>
+          <a:fontRef idx="minor"/>
+        </p:style>
+        <p:txBody>
+          <a:bodyPr wrap="none" lIns="90000" rIns="90000" tIns="45000" bIns="45000"/>
+          <a:p>
+            <a:pPr>
+              <a:lnSpc>
+                <a:spcPct val="100000"/>
+              </a:lnSpc>
+            </a:pPr>
+            <a:r>
+              <a:rPr lang="en-US" strike="noStrike">
+                <a:solidFill>
+                  <a:srgbClr val="000000"/>
+                </a:solidFill>
+                <a:latin typeface="Calibri"/>
+                <a:ea typeface="DejaVu Sans"/>
+              </a:rPr>
+              <a:t>get_cve_debian()</a:t>
+            </a:r>
+            <a:endParaRPr/>
+          </a:p>
+        </p:txBody>
+      </p:sp>
+      <p:sp>
+        <p:nvSpPr>
+          <p:cNvPr id="42" name="CustomShape 9"/>
+          <p:cNvSpPr/>
+          <p:nvPr/>
+        </p:nvSpPr>
+        <p:spPr>
+          <a:xfrm>
+            <a:off x="6165720" y="1371600"/>
+            <a:ext cx="2752560" cy="612720"/>
+          </a:xfrm>
+          <a:prstGeom prst="rect">
+            <a:avLst/>
+          </a:prstGeom>
+          <a:solidFill>
+            <a:srgbClr val="1f497d"/>
+          </a:solidFill>
+          <a:ln w="25560">
+            <a:solidFill>
+              <a:srgbClr val="3a5f8b"/>
+            </a:solidFill>
+            <a:round/>
+          </a:ln>
+        </p:spPr>
+        <p:style>
+          <a:lnRef idx="0"/>
+          <a:fillRef idx="0"/>
+          <a:effectRef idx="0"/>
+          <a:fontRef idx="minor"/>
+        </p:style>
+        <p:txBody>
+          <a:bodyPr lIns="90000" rIns="90000" tIns="45000" bIns="45000" anchor="ctr"/>
           <a:p>
             <a:pPr algn="ctr">
               <a:lnSpc>
@@ -1694,13 +1641,14 @@
               </a:lnSpc>
             </a:pPr>
             <a:r>
-              <a:rPr lang="en-US" i="1">
+              <a:rPr lang="en-US" strike="noStrike">
                 <a:solidFill>
-                  <a:srgbClr val="000000"/>
+                  <a:srgbClr val="ffffff"/>
                 </a:solidFill>
                 <a:latin typeface="Calibri"/>
+                <a:ea typeface="DejaVu Sans"/>
               </a:rPr>
-              <a:t> names in openhub and cve search keywords</a:t>
+              <a:t>www.openhub.net</a:t>
             </a:r>
             <a:endParaRPr/>
           </a:p>
@@ -1708,31 +1656,36 @@
       </p:sp>
       <p:sp>
         <p:nvSpPr>
-          <p:cNvPr id="40" name="CustomShape 5"/>
+          <p:cNvPr id="43" name="CustomShape 10"/>
           <p:cNvSpPr/>
           <p:nvPr/>
         </p:nvSpPr>
         <p:spPr>
           <a:xfrm>
-            <a:off x="3238560" y="5885640"/>
-            <a:ext cx="2208960" cy="456480"/>
+            <a:off x="6266520" y="3475800"/>
+            <a:ext cx="2511360" cy="1004400"/>
           </a:xfrm>
           <a:prstGeom prst="rect">
             <a:avLst/>
           </a:prstGeom>
           <a:solidFill>
-            <a:srgbClr val="FF0000"/>
+            <a:srgbClr val="1f497d"/>
           </a:solidFill>
           <a:ln w="25560">
             <a:solidFill>
-              <a:srgbClr val="3A5F8B"/>
+              <a:srgbClr val="3a5f8b"/>
             </a:solidFill>
             <a:round/>
           </a:ln>
         </p:spPr>
-        <p:txBody>
-          <a:bodyPr lIns="90000" tIns="45000" rIns="90000" bIns="45000" anchor="ctr"/>
-          <a:lstStyle/>
+        <p:style>
+          <a:lnRef idx="0"/>
+          <a:fillRef idx="0"/>
+          <a:effectRef idx="0"/>
+          <a:fontRef idx="minor"/>
+        </p:style>
+        <p:txBody>
+          <a:bodyPr lIns="90000" rIns="90000" tIns="45000" bIns="45000" anchor="ctr"/>
           <a:p>
             <a:pPr algn="ctr">
               <a:lnSpc>
@@ -1740,13 +1693,14 @@
               </a:lnSpc>
             </a:pPr>
             <a:r>
-              <a:rPr lang="en-US">
+              <a:rPr lang="en-US" strike="noStrike">
                 <a:solidFill>
-                  <a:srgbClr val="FFFFFF"/>
+                  <a:srgbClr val="ffffff"/>
                 </a:solidFill>
                 <a:latin typeface="Calibri"/>
+                <a:ea typeface="DejaVu Sans"/>
               </a:rPr>
-              <a:t>results.csv</a:t>
+              <a:t>security-tracker.debian.org/tracker/source-package/</a:t>
             </a:r>
             <a:endParaRPr/>
           </a:p>
@@ -1754,55 +1708,31 @@
       </p:sp>
       <p:sp>
         <p:nvSpPr>
-          <p:cNvPr id="41" name="CustomShape 6"/>
+          <p:cNvPr id="44" name="CustomShape 11"/>
           <p:cNvSpPr/>
           <p:nvPr/>
         </p:nvSpPr>
         <p:spPr>
           <a:xfrm>
-            <a:off x="4343400" y="3429000"/>
-            <a:ext cx="360" cy="2455920"/>
-          </a:xfrm>
-          <a:prstGeom prst="straightConnector1">
+            <a:off x="6350400" y="5791320"/>
+            <a:ext cx="2546640" cy="637560"/>
+          </a:xfrm>
+          <a:prstGeom prst="rect">
             <a:avLst/>
           </a:prstGeom>
           <a:noFill/>
-          <a:ln w="25560">
-            <a:solidFill>
-              <a:srgbClr val="000000"/>
-            </a:solidFill>
-            <a:round/>
-            <a:tailEnd type="arrow" w="med" len="med"/>
+          <a:ln>
+            <a:noFill/>
           </a:ln>
         </p:spPr>
-      </p:sp>
-      <p:sp>
-        <p:nvSpPr>
-          <p:cNvPr id="42" name="CustomShape 7"/>
-          <p:cNvSpPr/>
-          <p:nvPr/>
-        </p:nvSpPr>
-        <p:spPr>
-          <a:xfrm>
-            <a:off x="191160" y="3749040"/>
-            <a:ext cx="2643120" cy="685080"/>
-          </a:xfrm>
-          <a:prstGeom prst="rect">
-            <a:avLst/>
-          </a:prstGeom>
-          <a:solidFill>
-            <a:srgbClr val="1F497D"/>
-          </a:solidFill>
-          <a:ln w="25560">
-            <a:solidFill>
-              <a:srgbClr val="3A5F8B"/>
-            </a:solidFill>
-            <a:round/>
-          </a:ln>
-        </p:spPr>
-        <p:txBody>
-          <a:bodyPr lIns="90000" tIns="45000" rIns="90000" bIns="45000" anchor="ctr"/>
-          <a:lstStyle/>
+        <p:style>
+          <a:lnRef idx="0"/>
+          <a:fillRef idx="0"/>
+          <a:effectRef idx="0"/>
+          <a:fontRef idx="minor"/>
+        </p:style>
+        <p:txBody>
+          <a:bodyPr wrap="none" lIns="90000" rIns="90000" tIns="45000" bIns="45000"/>
           <a:p>
             <a:pPr algn="ctr">
               <a:lnSpc>
@@ -1810,52 +1740,122 @@
               </a:lnSpc>
             </a:pPr>
             <a:r>
-              <a:rPr lang="en-US">
+              <a:rPr i="1" lang="en-US" strike="noStrike">
                 <a:solidFill>
-                  <a:srgbClr val="FFFFFF"/>
+                  <a:srgbClr val="000000"/>
                 </a:solidFill>
                 <a:latin typeface="Calibri"/>
+                <a:ea typeface="DejaVu Sans"/>
               </a:rPr>
-              <a:t>apt_cache_dumpavail.txt</a:t>
+              <a:t>Note: Website</a:t>
             </a:r>
             <a:endParaRPr/>
           </a:p>
-        </p:txBody>
-      </p:sp>
-      <p:sp>
-        <p:nvSpPr>
-          <p:cNvPr id="43" name="CustomShape 8"/>
+          <a:p>
+            <a:pPr algn="ctr">
+              <a:lnSpc>
+                <a:spcPct val="100000"/>
+              </a:lnSpc>
+            </a:pPr>
+            <a:r>
+              <a:rPr i="1" lang="en-US" strike="noStrike">
+                <a:solidFill>
+                  <a:srgbClr val="000000"/>
+                </a:solidFill>
+                <a:latin typeface="Calibri"/>
+                <a:ea typeface="DejaVu Sans"/>
+              </a:rPr>
+              <a:t>accesses are cached</a:t>
+            </a:r>
+            <a:endParaRPr/>
+          </a:p>
+        </p:txBody>
+      </p:sp>
+      <p:sp>
+        <p:nvSpPr>
+          <p:cNvPr id="45" name="Line 12"/>
           <p:cNvSpPr/>
           <p:nvPr/>
         </p:nvSpPr>
         <p:spPr>
-          <a:xfrm flipV="1">
-            <a:off x="1463040" y="3198960"/>
-            <a:ext cx="1279800" cy="548280"/>
-          </a:xfrm>
-          <a:prstGeom prst="straightConnector1">
-            <a:avLst/>
-          </a:prstGeom>
-          <a:noFill/>
-          <a:ln w="12600">
+          <a:xfrm flipH="1" flipV="1">
+            <a:off x="5669280" y="3291840"/>
+            <a:ext cx="548640" cy="731520"/>
+          </a:xfrm>
+          <a:prstGeom prst="line">
+            <a:avLst/>
+          </a:prstGeom>
+          <a:ln cap="rnd">
             <a:solidFill>
               <a:srgbClr val="000000"/>
             </a:solidFill>
-            <a:round/>
-            <a:tailEnd type="arrow" w="med" len="med"/>
+            <a:custDash/>
+            <a:tailEnd len="med" type="triangle" w="med"/>
           </a:ln>
         </p:spPr>
       </p:sp>
       <p:sp>
         <p:nvSpPr>
-          <p:cNvPr id="44" name="CustomShape 9"/>
+          <p:cNvPr id="46" name="CustomShape 13"/>
           <p:cNvSpPr/>
           <p:nvPr/>
         </p:nvSpPr>
         <p:spPr>
           <a:xfrm>
-            <a:off x="394920" y="4481640"/>
-            <a:ext cx="2256480" cy="364320"/>
+            <a:off x="100800" y="1784520"/>
+            <a:ext cx="2367720" cy="684000"/>
+          </a:xfrm>
+          <a:prstGeom prst="rect">
+            <a:avLst/>
+          </a:prstGeom>
+          <a:solidFill>
+            <a:srgbClr val="1f497d"/>
+          </a:solidFill>
+          <a:ln w="25560">
+            <a:solidFill>
+              <a:srgbClr val="3a5f8b"/>
+            </a:solidFill>
+            <a:round/>
+          </a:ln>
+        </p:spPr>
+        <p:style>
+          <a:lnRef idx="0"/>
+          <a:fillRef idx="0"/>
+          <a:effectRef idx="0"/>
+          <a:fontRef idx="minor"/>
+        </p:style>
+        <p:txBody>
+          <a:bodyPr lIns="90000" rIns="90000" tIns="45000" bIns="45000" anchor="ctr"/>
+          <a:p>
+            <a:pPr algn="ctr">
+              <a:lnSpc>
+                <a:spcPct val="100000"/>
+              </a:lnSpc>
+            </a:pPr>
+            <a:r>
+              <a:rPr lang="en-US" strike="noStrike">
+                <a:solidFill>
+                  <a:srgbClr val="ffffff"/>
+                </a:solidFill>
+                <a:latin typeface="Calibri"/>
+                <a:ea typeface="DejaVu Sans"/>
+              </a:rPr>
+              <a:t>popcon.debian.org</a:t>
+            </a:r>
+            <a:endParaRPr/>
+          </a:p>
+        </p:txBody>
+      </p:sp>
+      <p:sp>
+        <p:nvSpPr>
+          <p:cNvPr id="47" name="CustomShape 14"/>
+          <p:cNvSpPr/>
+          <p:nvPr/>
+        </p:nvSpPr>
+        <p:spPr>
+          <a:xfrm>
+            <a:off x="0" y="2471040"/>
+            <a:ext cx="2255400" cy="363240"/>
           </a:xfrm>
           <a:prstGeom prst="rect">
             <a:avLst/>
@@ -1865,9 +1865,14 @@
             <a:noFill/>
           </a:ln>
         </p:spPr>
-        <p:txBody>
-          <a:bodyPr wrap="none" lIns="90000" tIns="45000" rIns="90000" bIns="45000"/>
-          <a:lstStyle/>
+        <p:style>
+          <a:lnRef idx="0"/>
+          <a:fillRef idx="0"/>
+          <a:effectRef idx="0"/>
+          <a:fontRef idx="minor"/>
+        </p:style>
+        <p:txBody>
+          <a:bodyPr wrap="none" lIns="90000" rIns="90000" tIns="45000" bIns="45000"/>
           <a:p>
             <a:pPr>
               <a:lnSpc>
@@ -1875,13 +1880,14 @@
               </a:lnSpc>
             </a:pPr>
             <a:r>
-              <a:rPr lang="en-US">
+              <a:rPr lang="en-US" strike="noStrike">
                 <a:solidFill>
                   <a:srgbClr val="000000"/>
                 </a:solidFill>
                 <a:latin typeface="Calibri"/>
+                <a:ea typeface="DejaVu Sans"/>
               </a:rPr>
-              <a:t>get_debian_data()</a:t>
+              <a:t>get_debian_pop()</a:t>
             </a:r>
             <a:endParaRPr/>
           </a:p>
@@ -1889,38 +1895,129 @@
       </p:sp>
       <p:sp>
         <p:nvSpPr>
-          <p:cNvPr id="45" name="CustomShape 10"/>
+          <p:cNvPr id="48" name="Line 15"/>
           <p:cNvSpPr/>
           <p:nvPr/>
         </p:nvSpPr>
         <p:spPr>
+          <a:xfrm>
+            <a:off x="2468880" y="2103120"/>
+            <a:ext cx="640080" cy="365760"/>
+          </a:xfrm>
+          <a:prstGeom prst="line">
+            <a:avLst/>
+          </a:prstGeom>
+          <a:ln cap="rnd">
+            <a:solidFill>
+              <a:srgbClr val="000000"/>
+            </a:solidFill>
+            <a:custDash/>
+            <a:tailEnd len="med" type="triangle" w="med"/>
+          </a:ln>
+        </p:spPr>
+      </p:sp>
+      <p:sp>
+        <p:nvSpPr>
+          <p:cNvPr id="49" name="Line 16"/>
+          <p:cNvSpPr/>
+          <p:nvPr/>
+        </p:nvSpPr>
+        <p:spPr>
           <a:xfrm flipH="1">
-            <a:off x="5689800" y="1616760"/>
-            <a:ext cx="1851480" cy="901080"/>
-          </a:xfrm>
-          <a:prstGeom prst="straightConnector1">
-            <a:avLst/>
-          </a:prstGeom>
-          <a:noFill/>
-          <a:ln w="12600">
+            <a:off x="5486400" y="1645920"/>
+            <a:ext cx="679320" cy="822960"/>
+          </a:xfrm>
+          <a:prstGeom prst="line">
+            <a:avLst/>
+          </a:prstGeom>
+          <a:ln cap="rnd">
+            <a:solidFill>
+              <a:srgbClr val="000000"/>
+            </a:solidFill>
+            <a:custDash/>
+            <a:tailEnd len="med" type="triangle" w="med"/>
+          </a:ln>
+        </p:spPr>
+      </p:sp>
+      <p:sp>
+        <p:nvSpPr>
+          <p:cNvPr id="50" name="Line 17"/>
+          <p:cNvSpPr/>
+          <p:nvPr/>
+        </p:nvSpPr>
+        <p:spPr>
+          <a:xfrm flipV="1">
+            <a:off x="1645920" y="3291840"/>
+            <a:ext cx="1188720" cy="731520"/>
+          </a:xfrm>
+          <a:prstGeom prst="line">
+            <a:avLst/>
+          </a:prstGeom>
+          <a:ln cap="rnd">
+            <a:solidFill>
+              <a:srgbClr val="000000"/>
+            </a:solidFill>
+            <a:custDash/>
+            <a:tailEnd len="med" type="triangle" w="med"/>
+          </a:ln>
+        </p:spPr>
+      </p:sp>
+      <p:sp>
+        <p:nvSpPr>
+          <p:cNvPr id="51" name="Line 18"/>
+          <p:cNvSpPr/>
+          <p:nvPr/>
+        </p:nvSpPr>
+        <p:spPr>
+          <a:xfrm>
+            <a:off x="4206240" y="1736280"/>
+            <a:ext cx="0" cy="641160"/>
+          </a:xfrm>
+          <a:prstGeom prst="line">
+            <a:avLst/>
+          </a:prstGeom>
+          <a:ln cap="rnd">
+            <a:solidFill>
+              <a:srgbClr val="000000"/>
+            </a:solidFill>
+            <a:custDash/>
+            <a:tailEnd len="med" type="triangle" w="med"/>
+          </a:ln>
+        </p:spPr>
+      </p:sp>
+      <p:sp>
+        <p:nvSpPr>
+          <p:cNvPr id="52" name="Line 19"/>
+          <p:cNvSpPr/>
+          <p:nvPr/>
+        </p:nvSpPr>
+        <p:spPr>
+          <a:xfrm>
+            <a:off x="4206240" y="3427560"/>
+            <a:ext cx="0" cy="2458080"/>
+          </a:xfrm>
+          <a:prstGeom prst="line">
+            <a:avLst/>
+          </a:prstGeom>
+          <a:ln w="29160">
             <a:solidFill>
               <a:srgbClr val="000000"/>
             </a:solidFill>
             <a:round/>
-            <a:tailEnd type="arrow" w="med" len="med"/>
+            <a:tailEnd len="med" type="triangle" w="med"/>
           </a:ln>
         </p:spPr>
       </p:sp>
       <p:sp>
         <p:nvSpPr>
-          <p:cNvPr id="46" name="CustomShape 11"/>
+          <p:cNvPr id="53" name="CustomShape 20"/>
           <p:cNvSpPr/>
           <p:nvPr/>
         </p:nvSpPr>
         <p:spPr>
           <a:xfrm>
-            <a:off x="6478560" y="2067480"/>
-            <a:ext cx="2482200" cy="364320"/>
+            <a:off x="3200400" y="548640"/>
+            <a:ext cx="2255400" cy="363240"/>
           </a:xfrm>
           <a:prstGeom prst="rect">
             <a:avLst/>
@@ -1930,9 +2027,14 @@
             <a:noFill/>
           </a:ln>
         </p:spPr>
-        <p:txBody>
-          <a:bodyPr wrap="none" lIns="90000" tIns="45000" rIns="90000" bIns="45000"/>
-          <a:lstStyle/>
+        <p:style>
+          <a:lnRef idx="0"/>
+          <a:fillRef idx="0"/>
+          <a:effectRef idx="0"/>
+          <a:fontRef idx="minor"/>
+        </p:style>
+        <p:txBody>
+          <a:bodyPr wrap="none" lIns="90000" rIns="90000" tIns="45000" bIns="45000"/>
           <a:p>
             <a:pPr>
               <a:lnSpc>
@@ -1940,277 +2042,21 @@
               </a:lnSpc>
             </a:pPr>
             <a:r>
-              <a:rPr lang="en-US">
+              <a:rPr lang="en-US" strike="noStrike">
                 <a:solidFill>
                   <a:srgbClr val="000000"/>
                 </a:solidFill>
                 <a:latin typeface="Calibri"/>
+                <a:ea typeface="DejaVu Sans"/>
               </a:rPr>
-              <a:t>get_openhub_data()</a:t>
+              <a:t>File with projects to analyze</a:t>
             </a:r>
             <a:endParaRPr/>
           </a:p>
         </p:txBody>
       </p:sp>
-      <p:sp>
-        <p:nvSpPr>
-          <p:cNvPr id="47" name="CustomShape 12"/>
-          <p:cNvSpPr/>
-          <p:nvPr/>
-        </p:nvSpPr>
-        <p:spPr>
-          <a:xfrm flipH="1" flipV="1">
-            <a:off x="5690160" y="3271680"/>
-            <a:ext cx="1715760" cy="476280"/>
-          </a:xfrm>
-          <a:prstGeom prst="straightConnector1">
-            <a:avLst/>
-          </a:prstGeom>
-          <a:noFill/>
-          <a:ln w="12600">
-            <a:solidFill>
-              <a:srgbClr val="000000"/>
-            </a:solidFill>
-            <a:round/>
-            <a:tailEnd type="arrow" w="med" len="med"/>
-          </a:ln>
-        </p:spPr>
-      </p:sp>
-      <p:sp>
-        <p:nvSpPr>
-          <p:cNvPr id="48" name="CustomShape 13"/>
-          <p:cNvSpPr/>
-          <p:nvPr/>
-        </p:nvSpPr>
-        <p:spPr>
-          <a:xfrm>
-            <a:off x="6807960" y="4480920"/>
-            <a:ext cx="1878480" cy="365040"/>
-          </a:xfrm>
-          <a:prstGeom prst="rect">
-            <a:avLst/>
-          </a:prstGeom>
-          <a:noFill/>
-          <a:ln>
-            <a:noFill/>
-          </a:ln>
-        </p:spPr>
-        <p:txBody>
-          <a:bodyPr wrap="none" lIns="90000" tIns="45000" rIns="90000" bIns="45000"/>
-          <a:lstStyle/>
-          <a:p>
-            <a:pPr>
-              <a:lnSpc>
-                <a:spcPct val="100000"/>
-              </a:lnSpc>
-            </a:pPr>
-            <a:r>
-              <a:rPr lang="en-US">
-                <a:solidFill>
-                  <a:srgbClr val="000000"/>
-                </a:solidFill>
-                <a:latin typeface="Calibri"/>
-              </a:rPr>
-              <a:t>get_cve_data()</a:t>
-            </a:r>
-            <a:endParaRPr/>
-          </a:p>
-        </p:txBody>
-      </p:sp>
-      <p:sp>
-        <p:nvSpPr>
-          <p:cNvPr id="49" name="CustomShape 14"/>
-          <p:cNvSpPr/>
-          <p:nvPr/>
-        </p:nvSpPr>
-        <p:spPr>
-          <a:xfrm>
-            <a:off x="6165720" y="1371600"/>
-            <a:ext cx="2753640" cy="613800"/>
-          </a:xfrm>
-          <a:prstGeom prst="rect">
-            <a:avLst/>
-          </a:prstGeom>
-          <a:solidFill>
-            <a:srgbClr val="1F497D"/>
-          </a:solidFill>
-          <a:ln w="25560">
-            <a:solidFill>
-              <a:srgbClr val="3A5F8B"/>
-            </a:solidFill>
-            <a:round/>
-          </a:ln>
-        </p:spPr>
-        <p:txBody>
-          <a:bodyPr lIns="90000" tIns="45000" rIns="90000" bIns="45000" anchor="ctr"/>
-          <a:lstStyle/>
-          <a:p>
-            <a:pPr algn="ctr">
-              <a:lnSpc>
-                <a:spcPct val="100000"/>
-              </a:lnSpc>
-            </a:pPr>
-            <a:r>
-              <a:rPr lang="en-US">
-                <a:solidFill>
-                  <a:srgbClr val="FFFFFF"/>
-                </a:solidFill>
-                <a:latin typeface="Calibri"/>
-              </a:rPr>
-              <a:t>https://www.openhub.net</a:t>
-            </a:r>
-            <a:endParaRPr/>
-          </a:p>
-        </p:txBody>
-      </p:sp>
-      <p:sp>
-        <p:nvSpPr>
-          <p:cNvPr id="50" name="CustomShape 15"/>
-          <p:cNvSpPr/>
-          <p:nvPr/>
-        </p:nvSpPr>
-        <p:spPr>
-          <a:xfrm>
-            <a:off x="6582600" y="3768840"/>
-            <a:ext cx="2147760" cy="711360"/>
-          </a:xfrm>
-          <a:prstGeom prst="rect">
-            <a:avLst/>
-          </a:prstGeom>
-          <a:solidFill>
-            <a:srgbClr val="1F497D"/>
-          </a:solidFill>
-          <a:ln w="25560">
-            <a:solidFill>
-              <a:srgbClr val="3A5F8B"/>
-            </a:solidFill>
-            <a:round/>
-          </a:ln>
-        </p:spPr>
-        <p:txBody>
-          <a:bodyPr lIns="90000" tIns="45000" rIns="90000" bIns="45000" anchor="ctr"/>
-          <a:lstStyle/>
-          <a:p>
-            <a:pPr algn="ctr">
-              <a:lnSpc>
-                <a:spcPct val="100000"/>
-              </a:lnSpc>
-            </a:pPr>
-            <a:r>
-              <a:rPr lang="en-US">
-                <a:solidFill>
-                  <a:srgbClr val="FFFFFF"/>
-                </a:solidFill>
-                <a:latin typeface="Calibri"/>
-              </a:rPr>
-              <a:t>https://cve.mitre.org</a:t>
-            </a:r>
-            <a:endParaRPr/>
-          </a:p>
-        </p:txBody>
-      </p:sp>
-      <p:sp>
-        <p:nvSpPr>
-          <p:cNvPr id="51" name="CustomShape 16"/>
-          <p:cNvSpPr/>
-          <p:nvPr/>
-        </p:nvSpPr>
-        <p:spPr>
-          <a:xfrm>
-            <a:off x="6350400" y="5791320"/>
-            <a:ext cx="2547720" cy="638640"/>
-          </a:xfrm>
-          <a:prstGeom prst="rect">
-            <a:avLst/>
-          </a:prstGeom>
-          <a:noFill/>
-          <a:ln>
-            <a:noFill/>
-          </a:ln>
-        </p:spPr>
-        <p:txBody>
-          <a:bodyPr wrap="none" lIns="90000" tIns="45000" rIns="90000" bIns="45000"/>
-          <a:lstStyle/>
-          <a:p>
-            <a:pPr algn="ctr">
-              <a:lnSpc>
-                <a:spcPct val="100000"/>
-              </a:lnSpc>
-            </a:pPr>
-            <a:r>
-              <a:rPr lang="en-US" i="1">
-                <a:solidFill>
-                  <a:srgbClr val="000000"/>
-                </a:solidFill>
-                <a:latin typeface="Calibri"/>
-              </a:rPr>
-              <a:t>Note: Website</a:t>
-            </a:r>
-            <a:endParaRPr/>
-          </a:p>
-          <a:p>
-            <a:pPr algn="ctr">
-              <a:lnSpc>
-                <a:spcPct val="100000"/>
-              </a:lnSpc>
-            </a:pPr>
-            <a:r>
-              <a:rPr lang="en-US" i="1">
-                <a:solidFill>
-                  <a:srgbClr val="000000"/>
-                </a:solidFill>
-                <a:latin typeface="Calibri"/>
-              </a:rPr>
-              <a:t>accesses are cached</a:t>
-            </a:r>
-            <a:endParaRPr/>
-          </a:p>
-        </p:txBody>
-      </p:sp>
-      <p:cxnSp>
-        <p:nvCxnSpPr>
-          <p:cNvPr id="3" name="Straight Arrow Connector 2"/>
-          <p:cNvCxnSpPr>
-            <a:stCxn id="37" idx="2"/>
-            <a:endCxn id="36" idx="0"/>
-          </p:cNvCxnSpPr>
-          <p:nvPr/>
-        </p:nvCxnSpPr>
-        <p:spPr>
-          <a:xfrm>
-            <a:off x="4247340" y="1737000"/>
-            <a:ext cx="19440" cy="625320"/>
-          </a:xfrm>
-          <a:prstGeom prst="straightConnector1">
-            <a:avLst/>
-          </a:prstGeom>
-          <a:ln w="25400">
-            <a:solidFill>
-              <a:schemeClr val="tx1"/>
-            </a:solidFill>
-            <a:tailEnd type="arrow"/>
-          </a:ln>
-        </p:spPr>
-        <p:style>
-          <a:lnRef idx="1">
-            <a:schemeClr val="accent1"/>
-          </a:lnRef>
-          <a:fillRef idx="0">
-            <a:schemeClr val="accent1"/>
-          </a:fillRef>
-          <a:effectRef idx="0">
-            <a:schemeClr val="accent1"/>
-          </a:effectRef>
-          <a:fontRef idx="minor">
-            <a:schemeClr val="tx1"/>
-          </a:fontRef>
-        </p:style>
-      </p:cxnSp>
     </p:spTree>
   </p:cSld>
-  <p:clrMapOvr>
-    <a:masterClrMapping/>
-  </p:clrMapOvr>
   <p:timing>
     <p:tnLst>
       <p:par>
@@ -2219,14 +2065,14 @@
             <p:seq>
               <p:cTn id="2" nodeType="mainSeq"/>
               <p:prevCondLst>
-                <p:cond evt="onPrev" delay="0">
+                <p:cond delay="0" evt="onPrev">
                   <p:tgtEl>
                     <p:sldTgt/>
                   </p:tgtEl>
                 </p:cond>
               </p:prevCondLst>
               <p:nextCondLst>
-                <p:cond evt="onNext" delay="0">
+                <p:cond delay="0" evt="onNext">
                   <p:tgtEl>
                     <p:sldTgt/>
                   </p:tgtEl>
@@ -2461,7 +2307,5 @@
       </a:bgFillStyleLst>
     </a:fmtScheme>
   </a:themeElements>
-  <a:objectDefaults/>
-  <a:extraClrSchemeLst/>
 </a:theme>
 </file>
</xml_diff>